<commit_message>
Added a few more figures
</commit_message>
<xml_diff>
--- a/multi_panel/Figure2.pptx
+++ b/multi_panel/Figure2.pptx
@@ -4,8 +4,13 @@
   <p:sldMasterIdLst>
     <p:sldMasterId id="2147483732" r:id="rId1"/>
   </p:sldMasterIdLst>
+  <p:notesMasterIdLst>
+    <p:notesMasterId r:id="rId5"/>
+  </p:notesMasterIdLst>
   <p:sldIdLst>
     <p:sldId id="256" r:id="rId2"/>
+    <p:sldId id="257" r:id="rId3"/>
+    <p:sldId id="258" r:id="rId4"/>
   </p:sldIdLst>
   <p:sldSz cx="6858000" cy="9144000" type="letter"/>
   <p:notesSz cx="6858000" cy="9144000"/>
@@ -104,7 +109,445 @@
       </a:defRPr>
     </a:lvl9pPr>
   </p:defaultTextStyle>
+  <p:extLst>
+    <p:ext uri="{EFAFB233-063F-42B5-8137-9DF3F51BA10A}">
+      <p15:sldGuideLst xmlns:p15="http://schemas.microsoft.com/office/powerpoint/2012/main"/>
+    </p:ext>
+  </p:extLst>
 </p:presentation>
+</file>
+
+<file path=ppt/notesMasters/notesMaster1.xml><?xml version="1.0" encoding="utf-8"?>
+<p:notesMaster xmlns:a="http://schemas.openxmlformats.org/drawingml/2006/main" xmlns:r="http://schemas.openxmlformats.org/officeDocument/2006/relationships" xmlns:p="http://schemas.openxmlformats.org/presentationml/2006/main">
+  <p:cSld>
+    <p:bg>
+      <p:bgRef idx="1001">
+        <a:schemeClr val="bg1"/>
+      </p:bgRef>
+    </p:bg>
+    <p:spTree>
+      <p:nvGrpSpPr>
+        <p:cNvPr id="1" name=""/>
+        <p:cNvGrpSpPr/>
+        <p:nvPr/>
+      </p:nvGrpSpPr>
+      <p:grpSpPr>
+        <a:xfrm>
+          <a:off x="0" y="0"/>
+          <a:ext cx="0" cy="0"/>
+          <a:chOff x="0" y="0"/>
+          <a:chExt cx="0" cy="0"/>
+        </a:xfrm>
+      </p:grpSpPr>
+      <p:sp>
+        <p:nvSpPr>
+          <p:cNvPr id="2" name="Header Placeholder 1"/>
+          <p:cNvSpPr>
+            <a:spLocks noGrp="1"/>
+          </p:cNvSpPr>
+          <p:nvPr>
+            <p:ph type="hdr" sz="quarter"/>
+          </p:nvPr>
+        </p:nvSpPr>
+        <p:spPr>
+          <a:xfrm>
+            <a:off x="0" y="0"/>
+            <a:ext cx="2971800" cy="458788"/>
+          </a:xfrm>
+          <a:prstGeom prst="rect">
+            <a:avLst/>
+          </a:prstGeom>
+        </p:spPr>
+        <p:txBody>
+          <a:bodyPr vert="horz" lIns="91440" tIns="45720" rIns="91440" bIns="45720" rtlCol="0"/>
+          <a:lstStyle>
+            <a:lvl1pPr algn="l">
+              <a:defRPr sz="1200"/>
+            </a:lvl1pPr>
+          </a:lstStyle>
+          <a:p>
+            <a:endParaRPr lang="en-US"/>
+          </a:p>
+        </p:txBody>
+      </p:sp>
+      <p:sp>
+        <p:nvSpPr>
+          <p:cNvPr id="3" name="Date Placeholder 2"/>
+          <p:cNvSpPr>
+            <a:spLocks noGrp="1"/>
+          </p:cNvSpPr>
+          <p:nvPr>
+            <p:ph type="dt" idx="1"/>
+          </p:nvPr>
+        </p:nvSpPr>
+        <p:spPr>
+          <a:xfrm>
+            <a:off x="3884613" y="0"/>
+            <a:ext cx="2971800" cy="458788"/>
+          </a:xfrm>
+          <a:prstGeom prst="rect">
+            <a:avLst/>
+          </a:prstGeom>
+        </p:spPr>
+        <p:txBody>
+          <a:bodyPr vert="horz" lIns="91440" tIns="45720" rIns="91440" bIns="45720" rtlCol="0"/>
+          <a:lstStyle>
+            <a:lvl1pPr algn="r">
+              <a:defRPr sz="1200"/>
+            </a:lvl1pPr>
+          </a:lstStyle>
+          <a:p>
+            <a:fld id="{6655240A-E1F9-DE48-9F45-1E587C6F8463}" type="datetimeFigureOut">
+              <a:rPr lang="en-US" smtClean="0"/>
+              <a:t>1/29/20</a:t>
+            </a:fld>
+            <a:endParaRPr lang="en-US"/>
+          </a:p>
+        </p:txBody>
+      </p:sp>
+      <p:sp>
+        <p:nvSpPr>
+          <p:cNvPr id="4" name="Slide Image Placeholder 3"/>
+          <p:cNvSpPr>
+            <a:spLocks noGrp="1" noRot="1" noChangeAspect="1"/>
+          </p:cNvSpPr>
+          <p:nvPr>
+            <p:ph type="sldImg" idx="2"/>
+          </p:nvPr>
+        </p:nvSpPr>
+        <p:spPr>
+          <a:xfrm>
+            <a:off x="2271713" y="1143000"/>
+            <a:ext cx="2314575" cy="3086100"/>
+          </a:xfrm>
+          <a:prstGeom prst="rect">
+            <a:avLst/>
+          </a:prstGeom>
+          <a:noFill/>
+          <a:ln w="12700">
+            <a:solidFill>
+              <a:prstClr val="black"/>
+            </a:solidFill>
+          </a:ln>
+        </p:spPr>
+        <p:txBody>
+          <a:bodyPr vert="horz" lIns="91440" tIns="45720" rIns="91440" bIns="45720" rtlCol="0" anchor="ctr"/>
+          <a:lstStyle/>
+          <a:p>
+            <a:endParaRPr lang="en-US"/>
+          </a:p>
+        </p:txBody>
+      </p:sp>
+      <p:sp>
+        <p:nvSpPr>
+          <p:cNvPr id="5" name="Notes Placeholder 4"/>
+          <p:cNvSpPr>
+            <a:spLocks noGrp="1"/>
+          </p:cNvSpPr>
+          <p:nvPr>
+            <p:ph type="body" sz="quarter" idx="3"/>
+          </p:nvPr>
+        </p:nvSpPr>
+        <p:spPr>
+          <a:xfrm>
+            <a:off x="685800" y="4400550"/>
+            <a:ext cx="5486400" cy="3600450"/>
+          </a:xfrm>
+          <a:prstGeom prst="rect">
+            <a:avLst/>
+          </a:prstGeom>
+        </p:spPr>
+        <p:txBody>
+          <a:bodyPr vert="horz" lIns="91440" tIns="45720" rIns="91440" bIns="45720" rtlCol="0"/>
+          <a:lstStyle/>
+          <a:p>
+            <a:pPr lvl="0"/>
+            <a:r>
+              <a:rPr lang="en-US"/>
+              <a:t>Click to edit Master text styles</a:t>
+            </a:r>
+          </a:p>
+          <a:p>
+            <a:pPr lvl="1"/>
+            <a:r>
+              <a:rPr lang="en-US"/>
+              <a:t>Second level</a:t>
+            </a:r>
+          </a:p>
+          <a:p>
+            <a:pPr lvl="2"/>
+            <a:r>
+              <a:rPr lang="en-US"/>
+              <a:t>Third level</a:t>
+            </a:r>
+          </a:p>
+          <a:p>
+            <a:pPr lvl="3"/>
+            <a:r>
+              <a:rPr lang="en-US"/>
+              <a:t>Fourth level</a:t>
+            </a:r>
+          </a:p>
+          <a:p>
+            <a:pPr lvl="4"/>
+            <a:r>
+              <a:rPr lang="en-US"/>
+              <a:t>Fifth level</a:t>
+            </a:r>
+          </a:p>
+        </p:txBody>
+      </p:sp>
+      <p:sp>
+        <p:nvSpPr>
+          <p:cNvPr id="6" name="Footer Placeholder 5"/>
+          <p:cNvSpPr>
+            <a:spLocks noGrp="1"/>
+          </p:cNvSpPr>
+          <p:nvPr>
+            <p:ph type="ftr" sz="quarter" idx="4"/>
+          </p:nvPr>
+        </p:nvSpPr>
+        <p:spPr>
+          <a:xfrm>
+            <a:off x="0" y="8685213"/>
+            <a:ext cx="2971800" cy="458787"/>
+          </a:xfrm>
+          <a:prstGeom prst="rect">
+            <a:avLst/>
+          </a:prstGeom>
+        </p:spPr>
+        <p:txBody>
+          <a:bodyPr vert="horz" lIns="91440" tIns="45720" rIns="91440" bIns="45720" rtlCol="0" anchor="b"/>
+          <a:lstStyle>
+            <a:lvl1pPr algn="l">
+              <a:defRPr sz="1200"/>
+            </a:lvl1pPr>
+          </a:lstStyle>
+          <a:p>
+            <a:endParaRPr lang="en-US"/>
+          </a:p>
+        </p:txBody>
+      </p:sp>
+      <p:sp>
+        <p:nvSpPr>
+          <p:cNvPr id="7" name="Slide Number Placeholder 6"/>
+          <p:cNvSpPr>
+            <a:spLocks noGrp="1"/>
+          </p:cNvSpPr>
+          <p:nvPr>
+            <p:ph type="sldNum" sz="quarter" idx="5"/>
+          </p:nvPr>
+        </p:nvSpPr>
+        <p:spPr>
+          <a:xfrm>
+            <a:off x="3884613" y="8685213"/>
+            <a:ext cx="2971800" cy="458787"/>
+          </a:xfrm>
+          <a:prstGeom prst="rect">
+            <a:avLst/>
+          </a:prstGeom>
+        </p:spPr>
+        <p:txBody>
+          <a:bodyPr vert="horz" lIns="91440" tIns="45720" rIns="91440" bIns="45720" rtlCol="0" anchor="b"/>
+          <a:lstStyle>
+            <a:lvl1pPr algn="r">
+              <a:defRPr sz="1200"/>
+            </a:lvl1pPr>
+          </a:lstStyle>
+          <a:p>
+            <a:fld id="{898A10FC-5BBD-0243-B153-6DEA9E582E61}" type="slidenum">
+              <a:rPr lang="en-US" smtClean="0"/>
+              <a:t>‹#›</a:t>
+            </a:fld>
+            <a:endParaRPr lang="en-US"/>
+          </a:p>
+        </p:txBody>
+      </p:sp>
+    </p:spTree>
+    <p:extLst>
+      <p:ext uri="{BB962C8B-B14F-4D97-AF65-F5344CB8AC3E}">
+        <p14:creationId xmlns:p14="http://schemas.microsoft.com/office/powerpoint/2010/main" val="991193727"/>
+      </p:ext>
+    </p:extLst>
+  </p:cSld>
+  <p:clrMap bg1="lt1" tx1="dk1" bg2="lt2" tx2="dk2" accent1="accent1" accent2="accent2" accent3="accent3" accent4="accent4" accent5="accent5" accent6="accent6" hlink="hlink" folHlink="folHlink"/>
+  <p:notesStyle>
+    <a:lvl1pPr marL="0" algn="l" defTabSz="914400" rtl="0" eaLnBrk="1" latinLnBrk="0" hangingPunct="1">
+      <a:defRPr sz="1200" kern="1200">
+        <a:solidFill>
+          <a:schemeClr val="tx1"/>
+        </a:solidFill>
+        <a:latin typeface="+mn-lt"/>
+        <a:ea typeface="+mn-ea"/>
+        <a:cs typeface="+mn-cs"/>
+      </a:defRPr>
+    </a:lvl1pPr>
+    <a:lvl2pPr marL="457200" algn="l" defTabSz="914400" rtl="0" eaLnBrk="1" latinLnBrk="0" hangingPunct="1">
+      <a:defRPr sz="1200" kern="1200">
+        <a:solidFill>
+          <a:schemeClr val="tx1"/>
+        </a:solidFill>
+        <a:latin typeface="+mn-lt"/>
+        <a:ea typeface="+mn-ea"/>
+        <a:cs typeface="+mn-cs"/>
+      </a:defRPr>
+    </a:lvl2pPr>
+    <a:lvl3pPr marL="914400" algn="l" defTabSz="914400" rtl="0" eaLnBrk="1" latinLnBrk="0" hangingPunct="1">
+      <a:defRPr sz="1200" kern="1200">
+        <a:solidFill>
+          <a:schemeClr val="tx1"/>
+        </a:solidFill>
+        <a:latin typeface="+mn-lt"/>
+        <a:ea typeface="+mn-ea"/>
+        <a:cs typeface="+mn-cs"/>
+      </a:defRPr>
+    </a:lvl3pPr>
+    <a:lvl4pPr marL="1371600" algn="l" defTabSz="914400" rtl="0" eaLnBrk="1" latinLnBrk="0" hangingPunct="1">
+      <a:defRPr sz="1200" kern="1200">
+        <a:solidFill>
+          <a:schemeClr val="tx1"/>
+        </a:solidFill>
+        <a:latin typeface="+mn-lt"/>
+        <a:ea typeface="+mn-ea"/>
+        <a:cs typeface="+mn-cs"/>
+      </a:defRPr>
+    </a:lvl4pPr>
+    <a:lvl5pPr marL="1828800" algn="l" defTabSz="914400" rtl="0" eaLnBrk="1" latinLnBrk="0" hangingPunct="1">
+      <a:defRPr sz="1200" kern="1200">
+        <a:solidFill>
+          <a:schemeClr val="tx1"/>
+        </a:solidFill>
+        <a:latin typeface="+mn-lt"/>
+        <a:ea typeface="+mn-ea"/>
+        <a:cs typeface="+mn-cs"/>
+      </a:defRPr>
+    </a:lvl5pPr>
+    <a:lvl6pPr marL="2286000" algn="l" defTabSz="914400" rtl="0" eaLnBrk="1" latinLnBrk="0" hangingPunct="1">
+      <a:defRPr sz="1200" kern="1200">
+        <a:solidFill>
+          <a:schemeClr val="tx1"/>
+        </a:solidFill>
+        <a:latin typeface="+mn-lt"/>
+        <a:ea typeface="+mn-ea"/>
+        <a:cs typeface="+mn-cs"/>
+      </a:defRPr>
+    </a:lvl6pPr>
+    <a:lvl7pPr marL="2743200" algn="l" defTabSz="914400" rtl="0" eaLnBrk="1" latinLnBrk="0" hangingPunct="1">
+      <a:defRPr sz="1200" kern="1200">
+        <a:solidFill>
+          <a:schemeClr val="tx1"/>
+        </a:solidFill>
+        <a:latin typeface="+mn-lt"/>
+        <a:ea typeface="+mn-ea"/>
+        <a:cs typeface="+mn-cs"/>
+      </a:defRPr>
+    </a:lvl7pPr>
+    <a:lvl8pPr marL="3200400" algn="l" defTabSz="914400" rtl="0" eaLnBrk="1" latinLnBrk="0" hangingPunct="1">
+      <a:defRPr sz="1200" kern="1200">
+        <a:solidFill>
+          <a:schemeClr val="tx1"/>
+        </a:solidFill>
+        <a:latin typeface="+mn-lt"/>
+        <a:ea typeface="+mn-ea"/>
+        <a:cs typeface="+mn-cs"/>
+      </a:defRPr>
+    </a:lvl8pPr>
+    <a:lvl9pPr marL="3657600" algn="l" defTabSz="914400" rtl="0" eaLnBrk="1" latinLnBrk="0" hangingPunct="1">
+      <a:defRPr sz="1200" kern="1200">
+        <a:solidFill>
+          <a:schemeClr val="tx1"/>
+        </a:solidFill>
+        <a:latin typeface="+mn-lt"/>
+        <a:ea typeface="+mn-ea"/>
+        <a:cs typeface="+mn-cs"/>
+      </a:defRPr>
+    </a:lvl9pPr>
+  </p:notesStyle>
+</p:notesMaster>
+</file>
+
+<file path=ppt/notesSlides/notesSlide1.xml><?xml version="1.0" encoding="utf-8"?>
+<p:notes xmlns:a="http://schemas.openxmlformats.org/drawingml/2006/main" xmlns:r="http://schemas.openxmlformats.org/officeDocument/2006/relationships" xmlns:p="http://schemas.openxmlformats.org/presentationml/2006/main">
+  <p:cSld>
+    <p:spTree>
+      <p:nvGrpSpPr>
+        <p:cNvPr id="1" name=""/>
+        <p:cNvGrpSpPr/>
+        <p:nvPr/>
+      </p:nvGrpSpPr>
+      <p:grpSpPr>
+        <a:xfrm>
+          <a:off x="0" y="0"/>
+          <a:ext cx="0" cy="0"/>
+          <a:chOff x="0" y="0"/>
+          <a:chExt cx="0" cy="0"/>
+        </a:xfrm>
+      </p:grpSpPr>
+      <p:sp>
+        <p:nvSpPr>
+          <p:cNvPr id="2" name="Slide Image Placeholder 1"/>
+          <p:cNvSpPr>
+            <a:spLocks noGrp="1" noRot="1" noChangeAspect="1"/>
+          </p:cNvSpPr>
+          <p:nvPr>
+            <p:ph type="sldImg"/>
+          </p:nvPr>
+        </p:nvSpPr>
+        <p:spPr/>
+      </p:sp>
+      <p:sp>
+        <p:nvSpPr>
+          <p:cNvPr id="3" name="Notes Placeholder 2"/>
+          <p:cNvSpPr>
+            <a:spLocks noGrp="1"/>
+          </p:cNvSpPr>
+          <p:nvPr>
+            <p:ph type="body" idx="1"/>
+          </p:nvPr>
+        </p:nvSpPr>
+        <p:spPr/>
+        <p:txBody>
+          <a:bodyPr/>
+          <a:lstStyle/>
+          <a:p>
+            <a:endParaRPr lang="en-US" dirty="0"/>
+          </a:p>
+        </p:txBody>
+      </p:sp>
+      <p:sp>
+        <p:nvSpPr>
+          <p:cNvPr id="4" name="Slide Number Placeholder 3"/>
+          <p:cNvSpPr>
+            <a:spLocks noGrp="1"/>
+          </p:cNvSpPr>
+          <p:nvPr>
+            <p:ph type="sldNum" sz="quarter" idx="5"/>
+          </p:nvPr>
+        </p:nvSpPr>
+        <p:spPr/>
+        <p:txBody>
+          <a:bodyPr/>
+          <a:lstStyle/>
+          <a:p>
+            <a:fld id="{898A10FC-5BBD-0243-B153-6DEA9E582E61}" type="slidenum">
+              <a:rPr lang="en-US" smtClean="0"/>
+              <a:t>1</a:t>
+            </a:fld>
+            <a:endParaRPr lang="en-US"/>
+          </a:p>
+        </p:txBody>
+      </p:sp>
+    </p:spTree>
+    <p:extLst>
+      <p:ext uri="{BB962C8B-B14F-4D97-AF65-F5344CB8AC3E}">
+        <p14:creationId xmlns:p14="http://schemas.microsoft.com/office/powerpoint/2010/main" val="3804953488"/>
+      </p:ext>
+    </p:extLst>
+  </p:cSld>
+  <p:clrMapOvr>
+    <a:masterClrMapping/>
+  </p:clrMapOvr>
+</p:notes>
 </file>
 
 <file path=ppt/slideLayouts/slideLayout1.xml><?xml version="1.0" encoding="utf-8"?>
@@ -168,7 +611,7 @@
         </p:nvSpPr>
         <p:spPr>
           <a:xfrm>
-            <a:off x="857250" y="4802717"/>
+            <a:off x="857250" y="4802718"/>
             <a:ext cx="5143500" cy="2207683"/>
           </a:xfrm>
         </p:spPr>
@@ -179,35 +622,35 @@
               <a:buNone/>
               <a:defRPr sz="1800"/>
             </a:lvl1pPr>
-            <a:lvl2pPr marL="342900" indent="0" algn="ctr">
+            <a:lvl2pPr marL="342925" indent="0" algn="ctr">
               <a:buNone/>
               <a:defRPr sz="1500"/>
             </a:lvl2pPr>
-            <a:lvl3pPr marL="685800" indent="0" algn="ctr">
+            <a:lvl3pPr marL="685849" indent="0" algn="ctr">
               <a:buNone/>
               <a:defRPr sz="1350"/>
             </a:lvl3pPr>
-            <a:lvl4pPr marL="1028700" indent="0" algn="ctr">
+            <a:lvl4pPr marL="1028774" indent="0" algn="ctr">
               <a:buNone/>
               <a:defRPr sz="1200"/>
             </a:lvl4pPr>
-            <a:lvl5pPr marL="1371600" indent="0" algn="ctr">
+            <a:lvl5pPr marL="1371699" indent="0" algn="ctr">
               <a:buNone/>
               <a:defRPr sz="1200"/>
             </a:lvl5pPr>
-            <a:lvl6pPr marL="1714500" indent="0" algn="ctr">
+            <a:lvl6pPr marL="1714623" indent="0" algn="ctr">
               <a:buNone/>
               <a:defRPr sz="1200"/>
             </a:lvl6pPr>
-            <a:lvl7pPr marL="2057400" indent="0" algn="ctr">
+            <a:lvl7pPr marL="2057548" indent="0" algn="ctr">
               <a:buNone/>
               <a:defRPr sz="1200"/>
             </a:lvl7pPr>
-            <a:lvl8pPr marL="2400300" indent="0" algn="ctr">
+            <a:lvl8pPr marL="2400472" indent="0" algn="ctr">
               <a:buNone/>
               <a:defRPr sz="1200"/>
             </a:lvl8pPr>
-            <a:lvl9pPr marL="2743200" indent="0" algn="ctr">
+            <a:lvl9pPr marL="2743397" indent="0" algn="ctr">
               <a:buNone/>
               <a:defRPr sz="1200"/>
             </a:lvl9pPr>
@@ -238,7 +681,7 @@
           <a:p>
             <a:fld id="{9DCD1679-434F-3744-9116-25F6CCA1F53C}" type="datetimeFigureOut">
               <a:rPr lang="en-US" smtClean="0"/>
-              <a:t>1/24/20</a:t>
+              <a:t>1/29/20</a:t>
             </a:fld>
             <a:endParaRPr lang="en-US"/>
           </a:p>
@@ -408,7 +851,7 @@
           <a:p>
             <a:fld id="{9DCD1679-434F-3744-9116-25F6CCA1F53C}" type="datetimeFigureOut">
               <a:rPr lang="en-US" smtClean="0"/>
-              <a:t>1/24/20</a:t>
+              <a:t>1/29/20</a:t>
             </a:fld>
             <a:endParaRPr lang="en-US"/>
           </a:p>
@@ -498,7 +941,7 @@
         </p:nvSpPr>
         <p:spPr>
           <a:xfrm>
-            <a:off x="4907757" y="486834"/>
+            <a:off x="4907757" y="486836"/>
             <a:ext cx="1478756" cy="7749117"/>
           </a:xfrm>
         </p:spPr>
@@ -526,7 +969,7 @@
         </p:nvSpPr>
         <p:spPr>
           <a:xfrm>
-            <a:off x="471488" y="486834"/>
+            <a:off x="471488" y="486836"/>
             <a:ext cx="4350544" cy="7749117"/>
           </a:xfrm>
         </p:spPr>
@@ -588,7 +1031,7 @@
           <a:p>
             <a:fld id="{9DCD1679-434F-3744-9116-25F6CCA1F53C}" type="datetimeFigureOut">
               <a:rPr lang="en-US" smtClean="0"/>
-              <a:t>1/24/20</a:t>
+              <a:t>1/29/20</a:t>
             </a:fld>
             <a:endParaRPr lang="en-US"/>
           </a:p>
@@ -758,7 +1201,7 @@
           <a:p>
             <a:fld id="{9DCD1679-434F-3744-9116-25F6CCA1F53C}" type="datetimeFigureOut">
               <a:rPr lang="en-US" smtClean="0"/>
-              <a:t>1/24/20</a:t>
+              <a:t>1/29/20</a:t>
             </a:fld>
             <a:endParaRPr lang="en-US"/>
           </a:p>
@@ -848,7 +1291,7 @@
         </p:nvSpPr>
         <p:spPr>
           <a:xfrm>
-            <a:off x="467916" y="2279653"/>
+            <a:off x="467916" y="2279655"/>
             <a:ext cx="5915025" cy="3803649"/>
           </a:xfrm>
         </p:spPr>
@@ -880,7 +1323,7 @@
         </p:nvSpPr>
         <p:spPr>
           <a:xfrm>
-            <a:off x="467916" y="6119286"/>
+            <a:off x="467916" y="6119288"/>
             <a:ext cx="5915025" cy="2000249"/>
           </a:xfrm>
         </p:spPr>
@@ -895,7 +1338,7 @@
                 </a:solidFill>
               </a:defRPr>
             </a:lvl1pPr>
-            <a:lvl2pPr marL="342900" indent="0">
+            <a:lvl2pPr marL="342925" indent="0">
               <a:buNone/>
               <a:defRPr sz="1500">
                 <a:solidFill>
@@ -905,7 +1348,7 @@
                 </a:solidFill>
               </a:defRPr>
             </a:lvl2pPr>
-            <a:lvl3pPr marL="685800" indent="0">
+            <a:lvl3pPr marL="685849" indent="0">
               <a:buNone/>
               <a:defRPr sz="1350">
                 <a:solidFill>
@@ -915,7 +1358,7 @@
                 </a:solidFill>
               </a:defRPr>
             </a:lvl3pPr>
-            <a:lvl4pPr marL="1028700" indent="0">
+            <a:lvl4pPr marL="1028774" indent="0">
               <a:buNone/>
               <a:defRPr sz="1200">
                 <a:solidFill>
@@ -925,7 +1368,7 @@
                 </a:solidFill>
               </a:defRPr>
             </a:lvl4pPr>
-            <a:lvl5pPr marL="1371600" indent="0">
+            <a:lvl5pPr marL="1371699" indent="0">
               <a:buNone/>
               <a:defRPr sz="1200">
                 <a:solidFill>
@@ -935,7 +1378,7 @@
                 </a:solidFill>
               </a:defRPr>
             </a:lvl5pPr>
-            <a:lvl6pPr marL="1714500" indent="0">
+            <a:lvl6pPr marL="1714623" indent="0">
               <a:buNone/>
               <a:defRPr sz="1200">
                 <a:solidFill>
@@ -945,7 +1388,7 @@
                 </a:solidFill>
               </a:defRPr>
             </a:lvl6pPr>
-            <a:lvl7pPr marL="2057400" indent="0">
+            <a:lvl7pPr marL="2057548" indent="0">
               <a:buNone/>
               <a:defRPr sz="1200">
                 <a:solidFill>
@@ -955,7 +1398,7 @@
                 </a:solidFill>
               </a:defRPr>
             </a:lvl7pPr>
-            <a:lvl8pPr marL="2400300" indent="0">
+            <a:lvl8pPr marL="2400472" indent="0">
               <a:buNone/>
               <a:defRPr sz="1200">
                 <a:solidFill>
@@ -965,7 +1408,7 @@
                 </a:solidFill>
               </a:defRPr>
             </a:lvl8pPr>
-            <a:lvl9pPr marL="2743200" indent="0">
+            <a:lvl9pPr marL="2743397" indent="0">
               <a:buNone/>
               <a:defRPr sz="1200">
                 <a:solidFill>
@@ -1002,7 +1445,7 @@
           <a:p>
             <a:fld id="{9DCD1679-434F-3744-9116-25F6CCA1F53C}" type="datetimeFigureOut">
               <a:rPr lang="en-US" smtClean="0"/>
-              <a:t>1/24/20</a:t>
+              <a:t>1/29/20</a:t>
             </a:fld>
             <a:endParaRPr lang="en-US"/>
           </a:p>
@@ -1234,7 +1677,7 @@
           <a:p>
             <a:fld id="{9DCD1679-434F-3744-9116-25F6CCA1F53C}" type="datetimeFigureOut">
               <a:rPr lang="en-US" smtClean="0"/>
-              <a:t>1/24/20</a:t>
+              <a:t>1/29/20</a:t>
             </a:fld>
             <a:endParaRPr lang="en-US"/>
           </a:p>
@@ -1324,7 +1767,7 @@
         </p:nvSpPr>
         <p:spPr>
           <a:xfrm>
-            <a:off x="472381" y="486836"/>
+            <a:off x="472381" y="486838"/>
             <a:ext cx="5915025" cy="1767417"/>
           </a:xfrm>
         </p:spPr>
@@ -1352,7 +1795,7 @@
         </p:nvSpPr>
         <p:spPr>
           <a:xfrm>
-            <a:off x="472381" y="2241551"/>
+            <a:off x="472382" y="2241553"/>
             <a:ext cx="2901255" cy="1098549"/>
           </a:xfrm>
         </p:spPr>
@@ -1363,35 +1806,35 @@
               <a:buNone/>
               <a:defRPr sz="1800" b="1"/>
             </a:lvl1pPr>
-            <a:lvl2pPr marL="342900" indent="0">
+            <a:lvl2pPr marL="342925" indent="0">
               <a:buNone/>
               <a:defRPr sz="1500" b="1"/>
             </a:lvl2pPr>
-            <a:lvl3pPr marL="685800" indent="0">
+            <a:lvl3pPr marL="685849" indent="0">
               <a:buNone/>
               <a:defRPr sz="1350" b="1"/>
             </a:lvl3pPr>
-            <a:lvl4pPr marL="1028700" indent="0">
+            <a:lvl4pPr marL="1028774" indent="0">
               <a:buNone/>
               <a:defRPr sz="1200" b="1"/>
             </a:lvl4pPr>
-            <a:lvl5pPr marL="1371600" indent="0">
+            <a:lvl5pPr marL="1371699" indent="0">
               <a:buNone/>
               <a:defRPr sz="1200" b="1"/>
             </a:lvl5pPr>
-            <a:lvl6pPr marL="1714500" indent="0">
+            <a:lvl6pPr marL="1714623" indent="0">
               <a:buNone/>
               <a:defRPr sz="1200" b="1"/>
             </a:lvl6pPr>
-            <a:lvl7pPr marL="2057400" indent="0">
+            <a:lvl7pPr marL="2057548" indent="0">
               <a:buNone/>
               <a:defRPr sz="1200" b="1"/>
             </a:lvl7pPr>
-            <a:lvl8pPr marL="2400300" indent="0">
+            <a:lvl8pPr marL="2400472" indent="0">
               <a:buNone/>
               <a:defRPr sz="1200" b="1"/>
             </a:lvl8pPr>
-            <a:lvl9pPr marL="2743200" indent="0">
+            <a:lvl9pPr marL="2743397" indent="0">
               <a:buNone/>
               <a:defRPr sz="1200" b="1"/>
             </a:lvl9pPr>
@@ -1417,7 +1860,7 @@
         </p:nvSpPr>
         <p:spPr>
           <a:xfrm>
-            <a:off x="472381" y="3340100"/>
+            <a:off x="472382" y="3340100"/>
             <a:ext cx="2901255" cy="4912784"/>
           </a:xfrm>
         </p:spPr>
@@ -1474,7 +1917,7 @@
         </p:nvSpPr>
         <p:spPr>
           <a:xfrm>
-            <a:off x="3471863" y="2241551"/>
+            <a:off x="3471864" y="2241553"/>
             <a:ext cx="2915543" cy="1098549"/>
           </a:xfrm>
         </p:spPr>
@@ -1485,35 +1928,35 @@
               <a:buNone/>
               <a:defRPr sz="1800" b="1"/>
             </a:lvl1pPr>
-            <a:lvl2pPr marL="342900" indent="0">
+            <a:lvl2pPr marL="342925" indent="0">
               <a:buNone/>
               <a:defRPr sz="1500" b="1"/>
             </a:lvl2pPr>
-            <a:lvl3pPr marL="685800" indent="0">
+            <a:lvl3pPr marL="685849" indent="0">
               <a:buNone/>
               <a:defRPr sz="1350" b="1"/>
             </a:lvl3pPr>
-            <a:lvl4pPr marL="1028700" indent="0">
+            <a:lvl4pPr marL="1028774" indent="0">
               <a:buNone/>
               <a:defRPr sz="1200" b="1"/>
             </a:lvl4pPr>
-            <a:lvl5pPr marL="1371600" indent="0">
+            <a:lvl5pPr marL="1371699" indent="0">
               <a:buNone/>
               <a:defRPr sz="1200" b="1"/>
             </a:lvl5pPr>
-            <a:lvl6pPr marL="1714500" indent="0">
+            <a:lvl6pPr marL="1714623" indent="0">
               <a:buNone/>
               <a:defRPr sz="1200" b="1"/>
             </a:lvl6pPr>
-            <a:lvl7pPr marL="2057400" indent="0">
+            <a:lvl7pPr marL="2057548" indent="0">
               <a:buNone/>
               <a:defRPr sz="1200" b="1"/>
             </a:lvl7pPr>
-            <a:lvl8pPr marL="2400300" indent="0">
+            <a:lvl8pPr marL="2400472" indent="0">
               <a:buNone/>
               <a:defRPr sz="1200" b="1"/>
             </a:lvl8pPr>
-            <a:lvl9pPr marL="2743200" indent="0">
+            <a:lvl9pPr marL="2743397" indent="0">
               <a:buNone/>
               <a:defRPr sz="1200" b="1"/>
             </a:lvl9pPr>
@@ -1539,7 +1982,7 @@
         </p:nvSpPr>
         <p:spPr>
           <a:xfrm>
-            <a:off x="3471863" y="3340100"/>
+            <a:off x="3471864" y="3340100"/>
             <a:ext cx="2915543" cy="4912784"/>
           </a:xfrm>
         </p:spPr>
@@ -1601,7 +2044,7 @@
           <a:p>
             <a:fld id="{9DCD1679-434F-3744-9116-25F6CCA1F53C}" type="datetimeFigureOut">
               <a:rPr lang="en-US" smtClean="0"/>
-              <a:t>1/24/20</a:t>
+              <a:t>1/29/20</a:t>
             </a:fld>
             <a:endParaRPr lang="en-US"/>
           </a:p>
@@ -1719,7 +2162,7 @@
           <a:p>
             <a:fld id="{9DCD1679-434F-3744-9116-25F6CCA1F53C}" type="datetimeFigureOut">
               <a:rPr lang="en-US" smtClean="0"/>
-              <a:t>1/24/20</a:t>
+              <a:t>1/29/20</a:t>
             </a:fld>
             <a:endParaRPr lang="en-US"/>
           </a:p>
@@ -1814,7 +2257,7 @@
           <a:p>
             <a:fld id="{9DCD1679-434F-3744-9116-25F6CCA1F53C}" type="datetimeFigureOut">
               <a:rPr lang="en-US" smtClean="0"/>
-              <a:t>1/24/20</a:t>
+              <a:t>1/29/20</a:t>
             </a:fld>
             <a:endParaRPr lang="en-US"/>
           </a:p>
@@ -1936,7 +2379,7 @@
         </p:nvSpPr>
         <p:spPr>
           <a:xfrm>
-            <a:off x="2915543" y="1316569"/>
+            <a:off x="2915544" y="1316571"/>
             <a:ext cx="3471863" cy="6498167"/>
           </a:xfrm>
         </p:spPr>
@@ -2021,7 +2464,7 @@
         </p:nvSpPr>
         <p:spPr>
           <a:xfrm>
-            <a:off x="472381" y="2743200"/>
+            <a:off x="472381" y="2743202"/>
             <a:ext cx="2211884" cy="5082117"/>
           </a:xfrm>
         </p:spPr>
@@ -2032,35 +2475,35 @@
               <a:buNone/>
               <a:defRPr sz="1200"/>
             </a:lvl1pPr>
-            <a:lvl2pPr marL="342900" indent="0">
+            <a:lvl2pPr marL="342925" indent="0">
               <a:buNone/>
               <a:defRPr sz="1050"/>
             </a:lvl2pPr>
-            <a:lvl3pPr marL="685800" indent="0">
+            <a:lvl3pPr marL="685849" indent="0">
               <a:buNone/>
               <a:defRPr sz="900"/>
             </a:lvl3pPr>
-            <a:lvl4pPr marL="1028700" indent="0">
+            <a:lvl4pPr marL="1028774" indent="0">
               <a:buNone/>
               <a:defRPr sz="750"/>
             </a:lvl4pPr>
-            <a:lvl5pPr marL="1371600" indent="0">
+            <a:lvl5pPr marL="1371699" indent="0">
               <a:buNone/>
               <a:defRPr sz="750"/>
             </a:lvl5pPr>
-            <a:lvl6pPr marL="1714500" indent="0">
+            <a:lvl6pPr marL="1714623" indent="0">
               <a:buNone/>
               <a:defRPr sz="750"/>
             </a:lvl6pPr>
-            <a:lvl7pPr marL="2057400" indent="0">
+            <a:lvl7pPr marL="2057548" indent="0">
               <a:buNone/>
               <a:defRPr sz="750"/>
             </a:lvl7pPr>
-            <a:lvl8pPr marL="2400300" indent="0">
+            <a:lvl8pPr marL="2400472" indent="0">
               <a:buNone/>
               <a:defRPr sz="750"/>
             </a:lvl8pPr>
-            <a:lvl9pPr marL="2743200" indent="0">
+            <a:lvl9pPr marL="2743397" indent="0">
               <a:buNone/>
               <a:defRPr sz="750"/>
             </a:lvl9pPr>
@@ -2091,7 +2534,7 @@
           <a:p>
             <a:fld id="{9DCD1679-434F-3744-9116-25F6CCA1F53C}" type="datetimeFigureOut">
               <a:rPr lang="en-US" smtClean="0"/>
-              <a:t>1/24/20</a:t>
+              <a:t>1/29/20</a:t>
             </a:fld>
             <a:endParaRPr lang="en-US"/>
           </a:p>
@@ -2213,7 +2656,7 @@
         </p:nvSpPr>
         <p:spPr>
           <a:xfrm>
-            <a:off x="2915543" y="1316569"/>
+            <a:off x="2915544" y="1316571"/>
             <a:ext cx="3471863" cy="6498167"/>
           </a:xfrm>
         </p:spPr>
@@ -2224,35 +2667,35 @@
               <a:buNone/>
               <a:defRPr sz="2400"/>
             </a:lvl1pPr>
-            <a:lvl2pPr marL="342900" indent="0">
+            <a:lvl2pPr marL="342925" indent="0">
               <a:buNone/>
               <a:defRPr sz="2100"/>
             </a:lvl2pPr>
-            <a:lvl3pPr marL="685800" indent="0">
+            <a:lvl3pPr marL="685849" indent="0">
               <a:buNone/>
               <a:defRPr sz="1800"/>
             </a:lvl3pPr>
-            <a:lvl4pPr marL="1028700" indent="0">
+            <a:lvl4pPr marL="1028774" indent="0">
               <a:buNone/>
               <a:defRPr sz="1500"/>
             </a:lvl4pPr>
-            <a:lvl5pPr marL="1371600" indent="0">
+            <a:lvl5pPr marL="1371699" indent="0">
               <a:buNone/>
               <a:defRPr sz="1500"/>
             </a:lvl5pPr>
-            <a:lvl6pPr marL="1714500" indent="0">
+            <a:lvl6pPr marL="1714623" indent="0">
               <a:buNone/>
               <a:defRPr sz="1500"/>
             </a:lvl6pPr>
-            <a:lvl7pPr marL="2057400" indent="0">
+            <a:lvl7pPr marL="2057548" indent="0">
               <a:buNone/>
               <a:defRPr sz="1500"/>
             </a:lvl7pPr>
-            <a:lvl8pPr marL="2400300" indent="0">
+            <a:lvl8pPr marL="2400472" indent="0">
               <a:buNone/>
               <a:defRPr sz="1500"/>
             </a:lvl8pPr>
-            <a:lvl9pPr marL="2743200" indent="0">
+            <a:lvl9pPr marL="2743397" indent="0">
               <a:buNone/>
               <a:defRPr sz="1500"/>
             </a:lvl9pPr>
@@ -2278,7 +2721,7 @@
         </p:nvSpPr>
         <p:spPr>
           <a:xfrm>
-            <a:off x="472381" y="2743200"/>
+            <a:off x="472381" y="2743202"/>
             <a:ext cx="2211884" cy="5082117"/>
           </a:xfrm>
         </p:spPr>
@@ -2289,35 +2732,35 @@
               <a:buNone/>
               <a:defRPr sz="1200"/>
             </a:lvl1pPr>
-            <a:lvl2pPr marL="342900" indent="0">
+            <a:lvl2pPr marL="342925" indent="0">
               <a:buNone/>
               <a:defRPr sz="1050"/>
             </a:lvl2pPr>
-            <a:lvl3pPr marL="685800" indent="0">
+            <a:lvl3pPr marL="685849" indent="0">
               <a:buNone/>
               <a:defRPr sz="900"/>
             </a:lvl3pPr>
-            <a:lvl4pPr marL="1028700" indent="0">
+            <a:lvl4pPr marL="1028774" indent="0">
               <a:buNone/>
               <a:defRPr sz="750"/>
             </a:lvl4pPr>
-            <a:lvl5pPr marL="1371600" indent="0">
+            <a:lvl5pPr marL="1371699" indent="0">
               <a:buNone/>
               <a:defRPr sz="750"/>
             </a:lvl5pPr>
-            <a:lvl6pPr marL="1714500" indent="0">
+            <a:lvl6pPr marL="1714623" indent="0">
               <a:buNone/>
               <a:defRPr sz="750"/>
             </a:lvl6pPr>
-            <a:lvl7pPr marL="2057400" indent="0">
+            <a:lvl7pPr marL="2057548" indent="0">
               <a:buNone/>
               <a:defRPr sz="750"/>
             </a:lvl7pPr>
-            <a:lvl8pPr marL="2400300" indent="0">
+            <a:lvl8pPr marL="2400472" indent="0">
               <a:buNone/>
               <a:defRPr sz="750"/>
             </a:lvl8pPr>
-            <a:lvl9pPr marL="2743200" indent="0">
+            <a:lvl9pPr marL="2743397" indent="0">
               <a:buNone/>
               <a:defRPr sz="750"/>
             </a:lvl9pPr>
@@ -2348,7 +2791,7 @@
           <a:p>
             <a:fld id="{9DCD1679-434F-3744-9116-25F6CCA1F53C}" type="datetimeFigureOut">
               <a:rPr lang="en-US" smtClean="0"/>
-              <a:t>1/24/20</a:t>
+              <a:t>1/29/20</a:t>
             </a:fld>
             <a:endParaRPr lang="en-US"/>
           </a:p>
@@ -2443,7 +2886,7 @@
         </p:nvSpPr>
         <p:spPr>
           <a:xfrm>
-            <a:off x="471488" y="486836"/>
+            <a:off x="471488" y="486838"/>
             <a:ext cx="5915025" cy="1767417"/>
           </a:xfrm>
           <a:prstGeom prst="rect">
@@ -2538,7 +2981,7 @@
         </p:nvSpPr>
         <p:spPr>
           <a:xfrm>
-            <a:off x="471488" y="8475136"/>
+            <a:off x="471488" y="8475138"/>
             <a:ext cx="1543050" cy="486833"/>
           </a:xfrm>
           <a:prstGeom prst="rect">
@@ -2561,7 +3004,7 @@
           <a:p>
             <a:fld id="{9DCD1679-434F-3744-9116-25F6CCA1F53C}" type="datetimeFigureOut">
               <a:rPr lang="en-US" smtClean="0"/>
-              <a:t>1/24/20</a:t>
+              <a:t>1/29/20</a:t>
             </a:fld>
             <a:endParaRPr lang="en-US"/>
           </a:p>
@@ -2579,7 +3022,7 @@
         </p:nvSpPr>
         <p:spPr>
           <a:xfrm>
-            <a:off x="2271713" y="8475136"/>
+            <a:off x="2271713" y="8475138"/>
             <a:ext cx="2314575" cy="486833"/>
           </a:xfrm>
           <a:prstGeom prst="rect">
@@ -2616,7 +3059,7 @@
         </p:nvSpPr>
         <p:spPr>
           <a:xfrm>
-            <a:off x="4843463" y="8475136"/>
+            <a:off x="4843463" y="8475138"/>
             <a:ext cx="1543050" cy="486833"/>
           </a:xfrm>
           <a:prstGeom prst="rect">
@@ -2668,7 +3111,7 @@
   </p:sldLayoutIdLst>
   <p:txStyles>
     <p:titleStyle>
-      <a:lvl1pPr algn="l" defTabSz="685800" rtl="0" eaLnBrk="1" latinLnBrk="0" hangingPunct="1">
+      <a:lvl1pPr algn="l" defTabSz="685849" rtl="0" eaLnBrk="1" latinLnBrk="0" hangingPunct="1">
         <a:lnSpc>
           <a:spcPct val="90000"/>
         </a:lnSpc>
@@ -2687,7 +3130,7 @@
       </a:lvl1pPr>
     </p:titleStyle>
     <p:bodyStyle>
-      <a:lvl1pPr marL="171450" indent="-171450" algn="l" defTabSz="685800" rtl="0" eaLnBrk="1" latinLnBrk="0" hangingPunct="1">
+      <a:lvl1pPr marL="171462" indent="-171462" algn="l" defTabSz="685849" rtl="0" eaLnBrk="1" latinLnBrk="0" hangingPunct="1">
         <a:lnSpc>
           <a:spcPct val="90000"/>
         </a:lnSpc>
@@ -2705,7 +3148,7 @@
           <a:cs typeface="+mn-cs"/>
         </a:defRPr>
       </a:lvl1pPr>
-      <a:lvl2pPr marL="514350" indent="-171450" algn="l" defTabSz="685800" rtl="0" eaLnBrk="1" latinLnBrk="0" hangingPunct="1">
+      <a:lvl2pPr marL="514387" indent="-171462" algn="l" defTabSz="685849" rtl="0" eaLnBrk="1" latinLnBrk="0" hangingPunct="1">
         <a:lnSpc>
           <a:spcPct val="90000"/>
         </a:lnSpc>
@@ -2723,7 +3166,7 @@
           <a:cs typeface="+mn-cs"/>
         </a:defRPr>
       </a:lvl2pPr>
-      <a:lvl3pPr marL="857250" indent="-171450" algn="l" defTabSz="685800" rtl="0" eaLnBrk="1" latinLnBrk="0" hangingPunct="1">
+      <a:lvl3pPr marL="857311" indent="-171462" algn="l" defTabSz="685849" rtl="0" eaLnBrk="1" latinLnBrk="0" hangingPunct="1">
         <a:lnSpc>
           <a:spcPct val="90000"/>
         </a:lnSpc>
@@ -2741,7 +3184,7 @@
           <a:cs typeface="+mn-cs"/>
         </a:defRPr>
       </a:lvl3pPr>
-      <a:lvl4pPr marL="1200150" indent="-171450" algn="l" defTabSz="685800" rtl="0" eaLnBrk="1" latinLnBrk="0" hangingPunct="1">
+      <a:lvl4pPr marL="1200236" indent="-171462" algn="l" defTabSz="685849" rtl="0" eaLnBrk="1" latinLnBrk="0" hangingPunct="1">
         <a:lnSpc>
           <a:spcPct val="90000"/>
         </a:lnSpc>
@@ -2759,7 +3202,7 @@
           <a:cs typeface="+mn-cs"/>
         </a:defRPr>
       </a:lvl4pPr>
-      <a:lvl5pPr marL="1543050" indent="-171450" algn="l" defTabSz="685800" rtl="0" eaLnBrk="1" latinLnBrk="0" hangingPunct="1">
+      <a:lvl5pPr marL="1543161" indent="-171462" algn="l" defTabSz="685849" rtl="0" eaLnBrk="1" latinLnBrk="0" hangingPunct="1">
         <a:lnSpc>
           <a:spcPct val="90000"/>
         </a:lnSpc>
@@ -2777,7 +3220,7 @@
           <a:cs typeface="+mn-cs"/>
         </a:defRPr>
       </a:lvl5pPr>
-      <a:lvl6pPr marL="1885950" indent="-171450" algn="l" defTabSz="685800" rtl="0" eaLnBrk="1" latinLnBrk="0" hangingPunct="1">
+      <a:lvl6pPr marL="1886085" indent="-171462" algn="l" defTabSz="685849" rtl="0" eaLnBrk="1" latinLnBrk="0" hangingPunct="1">
         <a:lnSpc>
           <a:spcPct val="90000"/>
         </a:lnSpc>
@@ -2795,7 +3238,7 @@
           <a:cs typeface="+mn-cs"/>
         </a:defRPr>
       </a:lvl6pPr>
-      <a:lvl7pPr marL="2228850" indent="-171450" algn="l" defTabSz="685800" rtl="0" eaLnBrk="1" latinLnBrk="0" hangingPunct="1">
+      <a:lvl7pPr marL="2229010" indent="-171462" algn="l" defTabSz="685849" rtl="0" eaLnBrk="1" latinLnBrk="0" hangingPunct="1">
         <a:lnSpc>
           <a:spcPct val="90000"/>
         </a:lnSpc>
@@ -2813,7 +3256,7 @@
           <a:cs typeface="+mn-cs"/>
         </a:defRPr>
       </a:lvl7pPr>
-      <a:lvl8pPr marL="2571750" indent="-171450" algn="l" defTabSz="685800" rtl="0" eaLnBrk="1" latinLnBrk="0" hangingPunct="1">
+      <a:lvl8pPr marL="2571934" indent="-171462" algn="l" defTabSz="685849" rtl="0" eaLnBrk="1" latinLnBrk="0" hangingPunct="1">
         <a:lnSpc>
           <a:spcPct val="90000"/>
         </a:lnSpc>
@@ -2831,7 +3274,7 @@
           <a:cs typeface="+mn-cs"/>
         </a:defRPr>
       </a:lvl8pPr>
-      <a:lvl9pPr marL="2914650" indent="-171450" algn="l" defTabSz="685800" rtl="0" eaLnBrk="1" latinLnBrk="0" hangingPunct="1">
+      <a:lvl9pPr marL="2914859" indent="-171462" algn="l" defTabSz="685849" rtl="0" eaLnBrk="1" latinLnBrk="0" hangingPunct="1">
         <a:lnSpc>
           <a:spcPct val="90000"/>
         </a:lnSpc>
@@ -2854,7 +3297,7 @@
       <a:defPPr>
         <a:defRPr lang="en-US"/>
       </a:defPPr>
-      <a:lvl1pPr marL="0" algn="l" defTabSz="685800" rtl="0" eaLnBrk="1" latinLnBrk="0" hangingPunct="1">
+      <a:lvl1pPr marL="0" algn="l" defTabSz="685849" rtl="0" eaLnBrk="1" latinLnBrk="0" hangingPunct="1">
         <a:defRPr sz="1350" kern="1200">
           <a:solidFill>
             <a:schemeClr val="tx1"/>
@@ -2864,7 +3307,7 @@
           <a:cs typeface="+mn-cs"/>
         </a:defRPr>
       </a:lvl1pPr>
-      <a:lvl2pPr marL="342900" algn="l" defTabSz="685800" rtl="0" eaLnBrk="1" latinLnBrk="0" hangingPunct="1">
+      <a:lvl2pPr marL="342925" algn="l" defTabSz="685849" rtl="0" eaLnBrk="1" latinLnBrk="0" hangingPunct="1">
         <a:defRPr sz="1350" kern="1200">
           <a:solidFill>
             <a:schemeClr val="tx1"/>
@@ -2874,7 +3317,7 @@
           <a:cs typeface="+mn-cs"/>
         </a:defRPr>
       </a:lvl2pPr>
-      <a:lvl3pPr marL="685800" algn="l" defTabSz="685800" rtl="0" eaLnBrk="1" latinLnBrk="0" hangingPunct="1">
+      <a:lvl3pPr marL="685849" algn="l" defTabSz="685849" rtl="0" eaLnBrk="1" latinLnBrk="0" hangingPunct="1">
         <a:defRPr sz="1350" kern="1200">
           <a:solidFill>
             <a:schemeClr val="tx1"/>
@@ -2884,7 +3327,7 @@
           <a:cs typeface="+mn-cs"/>
         </a:defRPr>
       </a:lvl3pPr>
-      <a:lvl4pPr marL="1028700" algn="l" defTabSz="685800" rtl="0" eaLnBrk="1" latinLnBrk="0" hangingPunct="1">
+      <a:lvl4pPr marL="1028774" algn="l" defTabSz="685849" rtl="0" eaLnBrk="1" latinLnBrk="0" hangingPunct="1">
         <a:defRPr sz="1350" kern="1200">
           <a:solidFill>
             <a:schemeClr val="tx1"/>
@@ -2894,7 +3337,7 @@
           <a:cs typeface="+mn-cs"/>
         </a:defRPr>
       </a:lvl4pPr>
-      <a:lvl5pPr marL="1371600" algn="l" defTabSz="685800" rtl="0" eaLnBrk="1" latinLnBrk="0" hangingPunct="1">
+      <a:lvl5pPr marL="1371699" algn="l" defTabSz="685849" rtl="0" eaLnBrk="1" latinLnBrk="0" hangingPunct="1">
         <a:defRPr sz="1350" kern="1200">
           <a:solidFill>
             <a:schemeClr val="tx1"/>
@@ -2904,7 +3347,7 @@
           <a:cs typeface="+mn-cs"/>
         </a:defRPr>
       </a:lvl5pPr>
-      <a:lvl6pPr marL="1714500" algn="l" defTabSz="685800" rtl="0" eaLnBrk="1" latinLnBrk="0" hangingPunct="1">
+      <a:lvl6pPr marL="1714623" algn="l" defTabSz="685849" rtl="0" eaLnBrk="1" latinLnBrk="0" hangingPunct="1">
         <a:defRPr sz="1350" kern="1200">
           <a:solidFill>
             <a:schemeClr val="tx1"/>
@@ -2914,7 +3357,7 @@
           <a:cs typeface="+mn-cs"/>
         </a:defRPr>
       </a:lvl6pPr>
-      <a:lvl7pPr marL="2057400" algn="l" defTabSz="685800" rtl="0" eaLnBrk="1" latinLnBrk="0" hangingPunct="1">
+      <a:lvl7pPr marL="2057548" algn="l" defTabSz="685849" rtl="0" eaLnBrk="1" latinLnBrk="0" hangingPunct="1">
         <a:defRPr sz="1350" kern="1200">
           <a:solidFill>
             <a:schemeClr val="tx1"/>
@@ -2924,7 +3367,7 @@
           <a:cs typeface="+mn-cs"/>
         </a:defRPr>
       </a:lvl7pPr>
-      <a:lvl8pPr marL="2400300" algn="l" defTabSz="685800" rtl="0" eaLnBrk="1" latinLnBrk="0" hangingPunct="1">
+      <a:lvl8pPr marL="2400472" algn="l" defTabSz="685849" rtl="0" eaLnBrk="1" latinLnBrk="0" hangingPunct="1">
         <a:defRPr sz="1350" kern="1200">
           <a:solidFill>
             <a:schemeClr val="tx1"/>
@@ -2934,7 +3377,7 @@
           <a:cs typeface="+mn-cs"/>
         </a:defRPr>
       </a:lvl8pPr>
-      <a:lvl9pPr marL="2743200" algn="l" defTabSz="685800" rtl="0" eaLnBrk="1" latinLnBrk="0" hangingPunct="1">
+      <a:lvl9pPr marL="2743397" algn="l" defTabSz="685849" rtl="0" eaLnBrk="1" latinLnBrk="0" hangingPunct="1">
         <a:defRPr sz="1350" kern="1200">
           <a:solidFill>
             <a:schemeClr val="tx1"/>
@@ -2966,273 +3409,371 @@
           <a:chExt cx="0" cy="0"/>
         </a:xfrm>
       </p:grpSpPr>
-      <p:grpSp>
-        <p:nvGrpSpPr>
-          <p:cNvPr id="30" name="Group 29">
+      <p:sp>
+        <p:nvSpPr>
+          <p:cNvPr id="60" name="TextBox 59">
             <a:extLst>
               <a:ext uri="{FF2B5EF4-FFF2-40B4-BE49-F238E27FC236}">
-                <a16:creationId xmlns:a16="http://schemas.microsoft.com/office/drawing/2014/main" id="{ABE6BB58-2424-624E-912B-73661F695622}"/>
+                <a16:creationId xmlns:a16="http://schemas.microsoft.com/office/drawing/2014/main" id="{D1884A7C-E883-5646-96A9-B3A2F9C6DA29}"/>
               </a:ext>
             </a:extLst>
           </p:cNvPr>
-          <p:cNvGrpSpPr/>
+          <p:cNvSpPr txBox="1"/>
           <p:nvPr/>
-        </p:nvGrpSpPr>
-        <p:grpSpPr>
-          <a:xfrm>
-            <a:off x="354486" y="1510001"/>
-            <a:ext cx="6149029" cy="686797"/>
-            <a:chOff x="1848060" y="6681044"/>
-            <a:chExt cx="32794819" cy="3662918"/>
-          </a:xfrm>
-        </p:grpSpPr>
-        <p:grpSp>
-          <p:nvGrpSpPr>
-            <p:cNvPr id="27" name="Group 26">
-              <a:extLst>
-                <a:ext uri="{FF2B5EF4-FFF2-40B4-BE49-F238E27FC236}">
-                  <a16:creationId xmlns:a16="http://schemas.microsoft.com/office/drawing/2014/main" id="{2F177E27-17C4-A04D-83B7-016A395C50CB}"/>
-                </a:ext>
-              </a:extLst>
-            </p:cNvPr>
-            <p:cNvGrpSpPr/>
-            <p:nvPr/>
-          </p:nvGrpSpPr>
-          <p:grpSpPr>
-            <a:xfrm>
-              <a:off x="1848060" y="6681044"/>
-              <a:ext cx="9867014" cy="3662918"/>
-              <a:chOff x="11455305" y="691118"/>
-              <a:chExt cx="9867014" cy="3662918"/>
-            </a:xfrm>
-          </p:grpSpPr>
-          <p:pic>
-            <p:nvPicPr>
-              <p:cNvPr id="11" name="Picture 10">
-                <a:extLst>
-                  <a:ext uri="{FF2B5EF4-FFF2-40B4-BE49-F238E27FC236}">
-                    <a16:creationId xmlns:a16="http://schemas.microsoft.com/office/drawing/2014/main" id="{91CB2F9E-E3CF-9043-8779-B0A4F27399E0}"/>
-                  </a:ext>
-                </a:extLst>
-              </p:cNvPr>
-              <p:cNvPicPr>
-                <a:picLocks noChangeAspect="1"/>
-              </p:cNvPicPr>
-              <p:nvPr/>
-            </p:nvPicPr>
-            <p:blipFill>
-              <a:blip r:embed="rId2"/>
-              <a:stretch>
-                <a:fillRect/>
-              </a:stretch>
-            </p:blipFill>
-            <p:spPr>
-              <a:xfrm>
-                <a:off x="11455305" y="691118"/>
-                <a:ext cx="7315200" cy="3657600"/>
-              </a:xfrm>
-              <a:prstGeom prst="rect">
-                <a:avLst/>
-              </a:prstGeom>
-            </p:spPr>
-          </p:pic>
-          <p:pic>
-            <p:nvPicPr>
-              <p:cNvPr id="13" name="Picture 12">
-                <a:extLst>
-                  <a:ext uri="{FF2B5EF4-FFF2-40B4-BE49-F238E27FC236}">
-                    <a16:creationId xmlns:a16="http://schemas.microsoft.com/office/drawing/2014/main" id="{973EA36A-93EA-7C4A-A3A6-772D83958781}"/>
-                  </a:ext>
-                </a:extLst>
-              </p:cNvPr>
-              <p:cNvPicPr>
-                <a:picLocks noChangeAspect="1"/>
-              </p:cNvPicPr>
-              <p:nvPr/>
-            </p:nvPicPr>
-            <p:blipFill rotWithShape="1">
-              <a:blip r:embed="rId3"/>
-              <a:srcRect l="65213" r="11531"/>
-              <a:stretch/>
-            </p:blipFill>
-            <p:spPr>
-              <a:xfrm>
-                <a:off x="18770505" y="696436"/>
-                <a:ext cx="2551814" cy="3657600"/>
-              </a:xfrm>
-              <a:prstGeom prst="rect">
-                <a:avLst/>
-              </a:prstGeom>
-            </p:spPr>
-          </p:pic>
-        </p:grpSp>
-        <p:grpSp>
-          <p:nvGrpSpPr>
-            <p:cNvPr id="28" name="Group 27">
-              <a:extLst>
-                <a:ext uri="{FF2B5EF4-FFF2-40B4-BE49-F238E27FC236}">
-                  <a16:creationId xmlns:a16="http://schemas.microsoft.com/office/drawing/2014/main" id="{638396FE-3AAE-C242-9FD8-71F26F86A0E2}"/>
-                </a:ext>
-              </a:extLst>
-            </p:cNvPr>
-            <p:cNvGrpSpPr/>
-            <p:nvPr/>
-          </p:nvGrpSpPr>
-          <p:grpSpPr>
-            <a:xfrm>
-              <a:off x="13354493" y="6681044"/>
-              <a:ext cx="9867014" cy="3657600"/>
-              <a:chOff x="21658521" y="691118"/>
-              <a:chExt cx="9867014" cy="3657600"/>
-            </a:xfrm>
-          </p:grpSpPr>
-          <p:pic>
-            <p:nvPicPr>
-              <p:cNvPr id="15" name="Picture 14">
-                <a:extLst>
-                  <a:ext uri="{FF2B5EF4-FFF2-40B4-BE49-F238E27FC236}">
-                    <a16:creationId xmlns:a16="http://schemas.microsoft.com/office/drawing/2014/main" id="{8DFEFA3F-F11A-4C44-8269-82C8555B728A}"/>
-                  </a:ext>
-                </a:extLst>
-              </p:cNvPr>
-              <p:cNvPicPr>
-                <a:picLocks noChangeAspect="1"/>
-              </p:cNvPicPr>
-              <p:nvPr/>
-            </p:nvPicPr>
-            <p:blipFill rotWithShape="1">
-              <a:blip r:embed="rId4"/>
-              <a:srcRect l="65139" r="11605"/>
-              <a:stretch/>
-            </p:blipFill>
-            <p:spPr>
-              <a:xfrm>
-                <a:off x="28973721" y="691118"/>
-                <a:ext cx="2551814" cy="3657600"/>
-              </a:xfrm>
-              <a:prstGeom prst="rect">
-                <a:avLst/>
-              </a:prstGeom>
-            </p:spPr>
-          </p:pic>
-          <p:pic>
-            <p:nvPicPr>
-              <p:cNvPr id="17" name="Picture 16">
-                <a:extLst>
-                  <a:ext uri="{FF2B5EF4-FFF2-40B4-BE49-F238E27FC236}">
-                    <a16:creationId xmlns:a16="http://schemas.microsoft.com/office/drawing/2014/main" id="{CE7F4462-8282-1C44-BCFB-1218D7C7AA20}"/>
-                  </a:ext>
-                </a:extLst>
-              </p:cNvPr>
-              <p:cNvPicPr>
-                <a:picLocks noChangeAspect="1"/>
-              </p:cNvPicPr>
-              <p:nvPr/>
-            </p:nvPicPr>
-            <p:blipFill>
-              <a:blip r:embed="rId5"/>
-              <a:stretch>
-                <a:fillRect/>
-              </a:stretch>
-            </p:blipFill>
-            <p:spPr>
-              <a:xfrm>
-                <a:off x="21658521" y="691118"/>
-                <a:ext cx="7315200" cy="3657600"/>
-              </a:xfrm>
-              <a:prstGeom prst="rect">
-                <a:avLst/>
-              </a:prstGeom>
-            </p:spPr>
-          </p:pic>
-        </p:grpSp>
-        <p:grpSp>
-          <p:nvGrpSpPr>
-            <p:cNvPr id="26" name="Group 25">
-              <a:extLst>
-                <a:ext uri="{FF2B5EF4-FFF2-40B4-BE49-F238E27FC236}">
-                  <a16:creationId xmlns:a16="http://schemas.microsoft.com/office/drawing/2014/main" id="{EBF547CC-09B1-DA44-A404-9FD1154CB819}"/>
-                </a:ext>
-              </a:extLst>
-            </p:cNvPr>
-            <p:cNvGrpSpPr/>
-            <p:nvPr/>
-          </p:nvGrpSpPr>
-          <p:grpSpPr>
-            <a:xfrm>
-              <a:off x="24860926" y="6681044"/>
-              <a:ext cx="9781953" cy="3657600"/>
-              <a:chOff x="5559552" y="7661898"/>
-              <a:chExt cx="9781953" cy="3657600"/>
-            </a:xfrm>
-          </p:grpSpPr>
-          <p:pic>
-            <p:nvPicPr>
-              <p:cNvPr id="19" name="Picture 18">
-                <a:extLst>
-                  <a:ext uri="{FF2B5EF4-FFF2-40B4-BE49-F238E27FC236}">
-                    <a16:creationId xmlns:a16="http://schemas.microsoft.com/office/drawing/2014/main" id="{6F079A15-A412-CC44-83C3-717035ED58DA}"/>
-                  </a:ext>
-                </a:extLst>
-              </p:cNvPr>
-              <p:cNvPicPr>
-                <a:picLocks noChangeAspect="1"/>
-              </p:cNvPicPr>
-              <p:nvPr/>
-            </p:nvPicPr>
-            <p:blipFill>
-              <a:blip r:embed="rId6"/>
-              <a:stretch>
-                <a:fillRect/>
-              </a:stretch>
-            </p:blipFill>
-            <p:spPr>
-              <a:xfrm>
-                <a:off x="5559552" y="7661898"/>
-                <a:ext cx="7315200" cy="3657600"/>
-              </a:xfrm>
-              <a:prstGeom prst="rect">
-                <a:avLst/>
-              </a:prstGeom>
-            </p:spPr>
-          </p:pic>
-          <p:pic>
-            <p:nvPicPr>
-              <p:cNvPr id="21" name="Picture 20">
-                <a:extLst>
-                  <a:ext uri="{FF2B5EF4-FFF2-40B4-BE49-F238E27FC236}">
-                    <a16:creationId xmlns:a16="http://schemas.microsoft.com/office/drawing/2014/main" id="{79774B91-5A71-9B4C-AA93-3FC2E06BEF7C}"/>
-                  </a:ext>
-                </a:extLst>
-              </p:cNvPr>
-              <p:cNvPicPr>
-                <a:picLocks noChangeAspect="1"/>
-              </p:cNvPicPr>
-              <p:nvPr/>
-            </p:nvPicPr>
-            <p:blipFill rotWithShape="1">
-              <a:blip r:embed="rId7"/>
-              <a:srcRect l="65481" r="12039"/>
-              <a:stretch/>
-            </p:blipFill>
-            <p:spPr>
-              <a:xfrm>
-                <a:off x="12874752" y="7661898"/>
-                <a:ext cx="2466753" cy="3657600"/>
-              </a:xfrm>
-              <a:prstGeom prst="rect">
-                <a:avLst/>
-              </a:prstGeom>
-            </p:spPr>
-          </p:pic>
-        </p:grpSp>
-      </p:grpSp>
+        </p:nvSpPr>
+        <p:spPr>
+          <a:xfrm>
+            <a:off x="21435" y="356961"/>
+            <a:ext cx="260008" cy="215444"/>
+          </a:xfrm>
+          <a:prstGeom prst="rect">
+            <a:avLst/>
+          </a:prstGeom>
+          <a:noFill/>
+        </p:spPr>
+        <p:txBody>
+          <a:bodyPr wrap="none" rtlCol="0">
+            <a:spAutoFit/>
+          </a:bodyPr>
+          <a:lstStyle/>
+          <a:p>
+            <a:r>
+              <a:rPr lang="en-US" sz="800" dirty="0"/>
+              <a:t>a.</a:t>
+            </a:r>
+          </a:p>
+        </p:txBody>
+      </p:sp>
+      <p:sp>
+        <p:nvSpPr>
+          <p:cNvPr id="62" name="TextBox 61">
+            <a:extLst>
+              <a:ext uri="{FF2B5EF4-FFF2-40B4-BE49-F238E27FC236}">
+                <a16:creationId xmlns:a16="http://schemas.microsoft.com/office/drawing/2014/main" id="{12A1E8A6-19B2-F845-8662-D895E33D27A0}"/>
+              </a:ext>
+            </a:extLst>
+          </p:cNvPr>
+          <p:cNvSpPr txBox="1"/>
+          <p:nvPr/>
+        </p:nvSpPr>
+        <p:spPr>
+          <a:xfrm>
+            <a:off x="20062" y="6506694"/>
+            <a:ext cx="258404" cy="215444"/>
+          </a:xfrm>
+          <a:prstGeom prst="rect">
+            <a:avLst/>
+          </a:prstGeom>
+          <a:noFill/>
+        </p:spPr>
+        <p:txBody>
+          <a:bodyPr wrap="none" rtlCol="0">
+            <a:spAutoFit/>
+          </a:bodyPr>
+          <a:lstStyle/>
+          <a:p>
+            <a:r>
+              <a:rPr lang="en-US" sz="800" dirty="0"/>
+              <a:t>g.</a:t>
+            </a:r>
+          </a:p>
+        </p:txBody>
+      </p:sp>
+      <p:sp>
+        <p:nvSpPr>
+          <p:cNvPr id="65" name="TextBox 64">
+            <a:extLst>
+              <a:ext uri="{FF2B5EF4-FFF2-40B4-BE49-F238E27FC236}">
+                <a16:creationId xmlns:a16="http://schemas.microsoft.com/office/drawing/2014/main" id="{A7E77559-ADD4-B348-A095-D2316267DF49}"/>
+              </a:ext>
+            </a:extLst>
+          </p:cNvPr>
+          <p:cNvSpPr txBox="1"/>
+          <p:nvPr/>
+        </p:nvSpPr>
+        <p:spPr>
+          <a:xfrm>
+            <a:off x="27593" y="1146326"/>
+            <a:ext cx="264816" cy="215444"/>
+          </a:xfrm>
+          <a:prstGeom prst="rect">
+            <a:avLst/>
+          </a:prstGeom>
+          <a:noFill/>
+        </p:spPr>
+        <p:txBody>
+          <a:bodyPr wrap="none" rtlCol="0">
+            <a:spAutoFit/>
+          </a:bodyPr>
+          <a:lstStyle/>
+          <a:p>
+            <a:r>
+              <a:rPr lang="en-US" sz="800" dirty="0"/>
+              <a:t>b.</a:t>
+            </a:r>
+          </a:p>
+        </p:txBody>
+      </p:sp>
+      <p:sp>
+        <p:nvSpPr>
+          <p:cNvPr id="68" name="TextBox 67">
+            <a:extLst>
+              <a:ext uri="{FF2B5EF4-FFF2-40B4-BE49-F238E27FC236}">
+                <a16:creationId xmlns:a16="http://schemas.microsoft.com/office/drawing/2014/main" id="{C657FBFA-2750-A74F-B51B-3B84243C3A71}"/>
+              </a:ext>
+            </a:extLst>
+          </p:cNvPr>
+          <p:cNvSpPr txBox="1"/>
+          <p:nvPr/>
+        </p:nvSpPr>
+        <p:spPr>
+          <a:xfrm>
+            <a:off x="30251" y="3034138"/>
+            <a:ext cx="264816" cy="215444"/>
+          </a:xfrm>
+          <a:prstGeom prst="rect">
+            <a:avLst/>
+          </a:prstGeom>
+          <a:noFill/>
+        </p:spPr>
+        <p:txBody>
+          <a:bodyPr wrap="none" rtlCol="0">
+            <a:spAutoFit/>
+          </a:bodyPr>
+          <a:lstStyle/>
+          <a:p>
+            <a:r>
+              <a:rPr lang="en-US" sz="800" dirty="0"/>
+              <a:t>d.</a:t>
+            </a:r>
+          </a:p>
+        </p:txBody>
+      </p:sp>
+      <p:sp>
+        <p:nvSpPr>
+          <p:cNvPr id="69" name="TextBox 68">
+            <a:extLst>
+              <a:ext uri="{FF2B5EF4-FFF2-40B4-BE49-F238E27FC236}">
+                <a16:creationId xmlns:a16="http://schemas.microsoft.com/office/drawing/2014/main" id="{26914B62-B81F-2946-882F-0EFE8AA1E4D0}"/>
+              </a:ext>
+            </a:extLst>
+          </p:cNvPr>
+          <p:cNvSpPr txBox="1"/>
+          <p:nvPr/>
+        </p:nvSpPr>
+        <p:spPr>
+          <a:xfrm>
+            <a:off x="20062" y="4010237"/>
+            <a:ext cx="261610" cy="215444"/>
+          </a:xfrm>
+          <a:prstGeom prst="rect">
+            <a:avLst/>
+          </a:prstGeom>
+          <a:noFill/>
+        </p:spPr>
+        <p:txBody>
+          <a:bodyPr wrap="none" rtlCol="0">
+            <a:spAutoFit/>
+          </a:bodyPr>
+          <a:lstStyle/>
+          <a:p>
+            <a:r>
+              <a:rPr lang="en-US" sz="800" dirty="0"/>
+              <a:t>e.</a:t>
+            </a:r>
+          </a:p>
+        </p:txBody>
+      </p:sp>
+      <p:sp>
+        <p:nvSpPr>
+          <p:cNvPr id="66" name="TextBox 65">
+            <a:extLst>
+              <a:ext uri="{FF2B5EF4-FFF2-40B4-BE49-F238E27FC236}">
+                <a16:creationId xmlns:a16="http://schemas.microsoft.com/office/drawing/2014/main" id="{74F5062A-9F77-3441-8D09-F213BE07429F}"/>
+              </a:ext>
+            </a:extLst>
+          </p:cNvPr>
+          <p:cNvSpPr txBox="1"/>
+          <p:nvPr/>
+        </p:nvSpPr>
+        <p:spPr>
+          <a:xfrm>
+            <a:off x="30251" y="2068941"/>
+            <a:ext cx="253596" cy="215444"/>
+          </a:xfrm>
+          <a:prstGeom prst="rect">
+            <a:avLst/>
+          </a:prstGeom>
+          <a:noFill/>
+        </p:spPr>
+        <p:txBody>
+          <a:bodyPr wrap="none" rtlCol="0">
+            <a:spAutoFit/>
+          </a:bodyPr>
+          <a:lstStyle/>
+          <a:p>
+            <a:r>
+              <a:rPr lang="en-US" sz="800" dirty="0"/>
+              <a:t>c.</a:t>
+            </a:r>
+          </a:p>
+        </p:txBody>
+      </p:sp>
       <p:pic>
         <p:nvPicPr>
-          <p:cNvPr id="23" name="Picture 22">
+          <p:cNvPr id="36" name="Picture 35">
             <a:extLst>
               <a:ext uri="{FF2B5EF4-FFF2-40B4-BE49-F238E27FC236}">
-                <a16:creationId xmlns:a16="http://schemas.microsoft.com/office/drawing/2014/main" id="{0E1CD7DB-11AA-F24B-90EC-ED0DBE4AD68B}"/>
+                <a16:creationId xmlns:a16="http://schemas.microsoft.com/office/drawing/2014/main" id="{478799BC-1779-1442-8DB6-D714DCA69E41}"/>
+              </a:ext>
+            </a:extLst>
+          </p:cNvPr>
+          <p:cNvPicPr>
+            <a:picLocks noChangeAspect="1"/>
+          </p:cNvPicPr>
+          <p:nvPr/>
+        </p:nvPicPr>
+        <p:blipFill>
+          <a:blip r:embed="rId3"/>
+          <a:stretch>
+            <a:fillRect/>
+          </a:stretch>
+        </p:blipFill>
+        <p:spPr>
+          <a:xfrm>
+            <a:off x="147975" y="5132253"/>
+            <a:ext cx="2730556" cy="1365279"/>
+          </a:xfrm>
+          <a:prstGeom prst="rect">
+            <a:avLst/>
+          </a:prstGeom>
+        </p:spPr>
+      </p:pic>
+      <p:pic>
+        <p:nvPicPr>
+          <p:cNvPr id="44" name="Picture 43">
+            <a:extLst>
+              <a:ext uri="{FF2B5EF4-FFF2-40B4-BE49-F238E27FC236}">
+                <a16:creationId xmlns:a16="http://schemas.microsoft.com/office/drawing/2014/main" id="{EAD763FE-8303-9149-8CDA-D22FA8758FC5}"/>
+              </a:ext>
+            </a:extLst>
+          </p:cNvPr>
+          <p:cNvPicPr>
+            <a:picLocks noChangeAspect="1"/>
+          </p:cNvPicPr>
+          <p:nvPr/>
+        </p:nvPicPr>
+        <p:blipFill>
+          <a:blip r:embed="rId4"/>
+          <a:stretch>
+            <a:fillRect/>
+          </a:stretch>
+        </p:blipFill>
+        <p:spPr>
+          <a:xfrm>
+            <a:off x="1968817" y="1221296"/>
+            <a:ext cx="1819428" cy="909714"/>
+          </a:xfrm>
+          <a:prstGeom prst="rect">
+            <a:avLst/>
+          </a:prstGeom>
+        </p:spPr>
+      </p:pic>
+      <p:pic>
+        <p:nvPicPr>
+          <p:cNvPr id="48" name="Picture 47">
+            <a:extLst>
+              <a:ext uri="{FF2B5EF4-FFF2-40B4-BE49-F238E27FC236}">
+                <a16:creationId xmlns:a16="http://schemas.microsoft.com/office/drawing/2014/main" id="{E07AC10A-655C-2D49-8CF6-6C95786CF6B4}"/>
+              </a:ext>
+            </a:extLst>
+          </p:cNvPr>
+          <p:cNvPicPr>
+            <a:picLocks noChangeAspect="1"/>
+          </p:cNvPicPr>
+          <p:nvPr/>
+        </p:nvPicPr>
+        <p:blipFill>
+          <a:blip r:embed="rId5"/>
+          <a:stretch>
+            <a:fillRect/>
+          </a:stretch>
+        </p:blipFill>
+        <p:spPr>
+          <a:xfrm>
+            <a:off x="209183" y="248149"/>
+            <a:ext cx="1929258" cy="964629"/>
+          </a:xfrm>
+          <a:prstGeom prst="rect">
+            <a:avLst/>
+          </a:prstGeom>
+        </p:spPr>
+      </p:pic>
+      <p:pic>
+        <p:nvPicPr>
+          <p:cNvPr id="53" name="Picture 52">
+            <a:extLst>
+              <a:ext uri="{FF2B5EF4-FFF2-40B4-BE49-F238E27FC236}">
+                <a16:creationId xmlns:a16="http://schemas.microsoft.com/office/drawing/2014/main" id="{B8AA56C8-FB1B-B84D-9046-BFE4B691BB38}"/>
+              </a:ext>
+            </a:extLst>
+          </p:cNvPr>
+          <p:cNvPicPr>
+            <a:picLocks noChangeAspect="1"/>
+          </p:cNvPicPr>
+          <p:nvPr/>
+        </p:nvPicPr>
+        <p:blipFill>
+          <a:blip r:embed="rId6"/>
+          <a:stretch>
+            <a:fillRect/>
+          </a:stretch>
+        </p:blipFill>
+        <p:spPr>
+          <a:xfrm>
+            <a:off x="179656" y="1219302"/>
+            <a:ext cx="1816006" cy="908003"/>
+          </a:xfrm>
+          <a:prstGeom prst="rect">
+            <a:avLst/>
+          </a:prstGeom>
+        </p:spPr>
+      </p:pic>
+      <p:pic>
+        <p:nvPicPr>
+          <p:cNvPr id="55" name="Picture 54">
+            <a:extLst>
+              <a:ext uri="{FF2B5EF4-FFF2-40B4-BE49-F238E27FC236}">
+                <a16:creationId xmlns:a16="http://schemas.microsoft.com/office/drawing/2014/main" id="{65A780F9-1F7E-2547-92C7-87056F226D9C}"/>
+              </a:ext>
+            </a:extLst>
+          </p:cNvPr>
+          <p:cNvPicPr>
+            <a:picLocks noChangeAspect="1"/>
+          </p:cNvPicPr>
+          <p:nvPr/>
+        </p:nvPicPr>
+        <p:blipFill rotWithShape="1">
+          <a:blip r:embed="rId7"/>
+          <a:srcRect l="65539" r="11670"/>
+          <a:stretch/>
+        </p:blipFill>
+        <p:spPr>
+          <a:xfrm>
+            <a:off x="3751129" y="1219921"/>
+            <a:ext cx="621986" cy="909715"/>
+          </a:xfrm>
+          <a:prstGeom prst="rect">
+            <a:avLst/>
+          </a:prstGeom>
+        </p:spPr>
+      </p:pic>
+      <p:pic>
+        <p:nvPicPr>
+          <p:cNvPr id="58" name="Picture 57">
+            <a:extLst>
+              <a:ext uri="{FF2B5EF4-FFF2-40B4-BE49-F238E27FC236}">
+                <a16:creationId xmlns:a16="http://schemas.microsoft.com/office/drawing/2014/main" id="{80959177-9B06-874A-9B85-D99ACDCF98D2}"/>
               </a:ext>
             </a:extLst>
           </p:cNvPr>
@@ -3249,8 +3790,8 @@
         </p:blipFill>
         <p:spPr>
           <a:xfrm>
-            <a:off x="857250" y="2418906"/>
-            <a:ext cx="2571750" cy="1371600"/>
+            <a:off x="196978" y="2117857"/>
+            <a:ext cx="1902008" cy="951005"/>
           </a:xfrm>
           <a:prstGeom prst="rect">
             <a:avLst/>
@@ -3259,10 +3800,10 @@
       </p:pic>
       <p:pic>
         <p:nvPicPr>
-          <p:cNvPr id="25" name="Picture 24">
+          <p:cNvPr id="72" name="Picture 71">
             <a:extLst>
               <a:ext uri="{FF2B5EF4-FFF2-40B4-BE49-F238E27FC236}">
-                <a16:creationId xmlns:a16="http://schemas.microsoft.com/office/drawing/2014/main" id="{253FD91C-0B94-6147-B190-81FF454EBEB9}"/>
+                <a16:creationId xmlns:a16="http://schemas.microsoft.com/office/drawing/2014/main" id="{FB1CD362-21F5-C34D-AE08-16B6A44D8884}"/>
               </a:ext>
             </a:extLst>
           </p:cNvPr>
@@ -3279,180 +3820,138 @@
         </p:blipFill>
         <p:spPr>
           <a:xfrm>
-            <a:off x="3429000" y="2418906"/>
-            <a:ext cx="2571750" cy="1371600"/>
+            <a:off x="1995662" y="2116482"/>
+            <a:ext cx="1902008" cy="951004"/>
           </a:xfrm>
           <a:prstGeom prst="rect">
             <a:avLst/>
           </a:prstGeom>
         </p:spPr>
       </p:pic>
-      <p:grpSp>
-        <p:nvGrpSpPr>
-          <p:cNvPr id="37" name="Group 36">
+      <p:pic>
+        <p:nvPicPr>
+          <p:cNvPr id="74" name="Picture 73">
             <a:extLst>
               <a:ext uri="{FF2B5EF4-FFF2-40B4-BE49-F238E27FC236}">
-                <a16:creationId xmlns:a16="http://schemas.microsoft.com/office/drawing/2014/main" id="{CE6C1E67-1EF9-8340-A555-DD3670260C5E}"/>
+                <a16:creationId xmlns:a16="http://schemas.microsoft.com/office/drawing/2014/main" id="{90120054-4FE7-E246-A2BB-FFBF0CA8562B}"/>
               </a:ext>
             </a:extLst>
           </p:cNvPr>
-          <p:cNvGrpSpPr/>
+          <p:cNvPicPr>
+            <a:picLocks noChangeAspect="1"/>
+          </p:cNvPicPr>
           <p:nvPr/>
-        </p:nvGrpSpPr>
-        <p:grpSpPr>
-          <a:xfrm>
-            <a:off x="1100663" y="603090"/>
-            <a:ext cx="2084832" cy="685800"/>
-            <a:chOff x="7168896" y="1681842"/>
-            <a:chExt cx="11119104" cy="3657600"/>
-          </a:xfrm>
-        </p:grpSpPr>
-        <p:pic>
-          <p:nvPicPr>
-            <p:cNvPr id="5" name="Picture 4">
-              <a:extLst>
-                <a:ext uri="{FF2B5EF4-FFF2-40B4-BE49-F238E27FC236}">
-                  <a16:creationId xmlns:a16="http://schemas.microsoft.com/office/drawing/2014/main" id="{8CDA1338-87C7-D643-B7BF-F080662F7934}"/>
-                </a:ext>
-              </a:extLst>
-            </p:cNvPr>
-            <p:cNvPicPr>
-              <a:picLocks noChangeAspect="1"/>
-            </p:cNvPicPr>
-            <p:nvPr/>
-          </p:nvPicPr>
-          <p:blipFill rotWithShape="1">
-            <a:blip r:embed="rId10"/>
-            <a:srcRect l="57818" r="4364"/>
-            <a:stretch/>
-          </p:blipFill>
-          <p:spPr>
-            <a:xfrm>
-              <a:off x="14484096" y="1681842"/>
-              <a:ext cx="3803904" cy="3657600"/>
-            </a:xfrm>
-            <a:prstGeom prst="rect">
-              <a:avLst/>
-            </a:prstGeom>
-          </p:spPr>
-        </p:pic>
-        <p:pic>
-          <p:nvPicPr>
-            <p:cNvPr id="7" name="Picture 6">
-              <a:extLst>
-                <a:ext uri="{FF2B5EF4-FFF2-40B4-BE49-F238E27FC236}">
-                  <a16:creationId xmlns:a16="http://schemas.microsoft.com/office/drawing/2014/main" id="{CB65A458-AFE8-4D45-85B9-37F5707DFAEC}"/>
-                </a:ext>
-              </a:extLst>
-            </p:cNvPr>
-            <p:cNvPicPr>
-              <a:picLocks noChangeAspect="1"/>
-            </p:cNvPicPr>
-            <p:nvPr/>
-          </p:nvPicPr>
-          <p:blipFill>
-            <a:blip r:embed="rId11"/>
-            <a:stretch>
-              <a:fillRect/>
-            </a:stretch>
-          </p:blipFill>
-          <p:spPr>
-            <a:xfrm>
-              <a:off x="7168896" y="1681842"/>
-              <a:ext cx="7315200" cy="3657600"/>
-            </a:xfrm>
-            <a:prstGeom prst="rect">
-              <a:avLst/>
-            </a:prstGeom>
-          </p:spPr>
-        </p:pic>
-      </p:grpSp>
-      <p:grpSp>
-        <p:nvGrpSpPr>
-          <p:cNvPr id="38" name="Group 37">
+        </p:nvPicPr>
+        <p:blipFill rotWithShape="1">
+          <a:blip r:embed="rId10"/>
+          <a:srcRect l="65660" r="12403"/>
+          <a:stretch/>
+        </p:blipFill>
+        <p:spPr>
+          <a:xfrm>
+            <a:off x="3735639" y="2120813"/>
+            <a:ext cx="625868" cy="951005"/>
+          </a:xfrm>
+          <a:prstGeom prst="rect">
+            <a:avLst/>
+          </a:prstGeom>
+        </p:spPr>
+      </p:pic>
+      <p:pic>
+        <p:nvPicPr>
+          <p:cNvPr id="6" name="Picture 5">
             <a:extLst>
               <a:ext uri="{FF2B5EF4-FFF2-40B4-BE49-F238E27FC236}">
-                <a16:creationId xmlns:a16="http://schemas.microsoft.com/office/drawing/2014/main" id="{B30E4C26-D65E-114A-8CEF-3C9142A61466}"/>
+                <a16:creationId xmlns:a16="http://schemas.microsoft.com/office/drawing/2014/main" id="{A8464749-DD82-DC4D-B5F6-502A98D44470}"/>
               </a:ext>
             </a:extLst>
           </p:cNvPr>
-          <p:cNvGrpSpPr/>
+          <p:cNvPicPr>
+            <a:picLocks noChangeAspect="1"/>
+          </p:cNvPicPr>
           <p:nvPr/>
-        </p:nvGrpSpPr>
-        <p:grpSpPr>
-          <a:xfrm>
-            <a:off x="3672505" y="599101"/>
-            <a:ext cx="2155371" cy="687794"/>
-            <a:chOff x="18288000" y="1681842"/>
-            <a:chExt cx="11495314" cy="3668236"/>
-          </a:xfrm>
-        </p:grpSpPr>
-        <p:pic>
-          <p:nvPicPr>
-            <p:cNvPr id="32" name="Picture 31">
-              <a:extLst>
-                <a:ext uri="{FF2B5EF4-FFF2-40B4-BE49-F238E27FC236}">
-                  <a16:creationId xmlns:a16="http://schemas.microsoft.com/office/drawing/2014/main" id="{6E2F3E5C-0FBB-514D-89FF-70EEA93AA26F}"/>
-                </a:ext>
-              </a:extLst>
-            </p:cNvPr>
-            <p:cNvPicPr>
-              <a:picLocks noChangeAspect="1"/>
-            </p:cNvPicPr>
-            <p:nvPr/>
-          </p:nvPicPr>
-          <p:blipFill rotWithShape="1">
-            <a:blip r:embed="rId12"/>
-            <a:srcRect l="58859" r="3046"/>
-            <a:stretch/>
-          </p:blipFill>
-          <p:spPr>
-            <a:xfrm>
-              <a:off x="25603200" y="1681842"/>
-              <a:ext cx="4180114" cy="3657600"/>
-            </a:xfrm>
-            <a:prstGeom prst="rect">
-              <a:avLst/>
-            </a:prstGeom>
-          </p:spPr>
-        </p:pic>
-        <p:pic>
-          <p:nvPicPr>
-            <p:cNvPr id="34" name="Picture 33">
-              <a:extLst>
-                <a:ext uri="{FF2B5EF4-FFF2-40B4-BE49-F238E27FC236}">
-                  <a16:creationId xmlns:a16="http://schemas.microsoft.com/office/drawing/2014/main" id="{E110EEB8-8E7B-DE4C-A2E7-BD28E32FCFDD}"/>
-                </a:ext>
-              </a:extLst>
-            </p:cNvPr>
-            <p:cNvPicPr>
-              <a:picLocks noChangeAspect="1"/>
-            </p:cNvPicPr>
-            <p:nvPr/>
-          </p:nvPicPr>
-          <p:blipFill>
-            <a:blip r:embed="rId13"/>
-            <a:stretch>
-              <a:fillRect/>
-            </a:stretch>
-          </p:blipFill>
-          <p:spPr>
-            <a:xfrm>
-              <a:off x="18288000" y="1692478"/>
-              <a:ext cx="7315200" cy="3657600"/>
-            </a:xfrm>
-            <a:prstGeom prst="rect">
-              <a:avLst/>
-            </a:prstGeom>
-          </p:spPr>
-        </p:pic>
-      </p:grpSp>
+        </p:nvPicPr>
+        <p:blipFill>
+          <a:blip r:embed="rId11"/>
+          <a:stretch>
+            <a:fillRect/>
+          </a:stretch>
+        </p:blipFill>
+        <p:spPr>
+          <a:xfrm>
+            <a:off x="1989850" y="243423"/>
+            <a:ext cx="1929258" cy="964630"/>
+          </a:xfrm>
+          <a:prstGeom prst="rect">
+            <a:avLst/>
+          </a:prstGeom>
+        </p:spPr>
+      </p:pic>
       <p:pic>
         <p:nvPicPr>
-          <p:cNvPr id="41" name="Picture 40">
+          <p:cNvPr id="9" name="Picture 8">
             <a:extLst>
               <a:ext uri="{FF2B5EF4-FFF2-40B4-BE49-F238E27FC236}">
-                <a16:creationId xmlns:a16="http://schemas.microsoft.com/office/drawing/2014/main" id="{DDCC8619-68C2-A047-942A-40ABF18E0949}"/>
+                <a16:creationId xmlns:a16="http://schemas.microsoft.com/office/drawing/2014/main" id="{20939710-001C-704E-BF80-86C58D31D75D}"/>
+              </a:ext>
+            </a:extLst>
+          </p:cNvPr>
+          <p:cNvPicPr>
+            <a:picLocks noChangeAspect="1"/>
+          </p:cNvPicPr>
+          <p:nvPr/>
+        </p:nvPicPr>
+        <p:blipFill rotWithShape="1">
+          <a:blip r:embed="rId12"/>
+          <a:srcRect l="58764" r="4685"/>
+          <a:stretch/>
+        </p:blipFill>
+        <p:spPr>
+          <a:xfrm>
+            <a:off x="3742866" y="298341"/>
+            <a:ext cx="914400" cy="909712"/>
+          </a:xfrm>
+          <a:prstGeom prst="rect">
+            <a:avLst/>
+          </a:prstGeom>
+        </p:spPr>
+      </p:pic>
+      <p:pic>
+        <p:nvPicPr>
+          <p:cNvPr id="76" name="Picture 75">
+            <a:extLst>
+              <a:ext uri="{FF2B5EF4-FFF2-40B4-BE49-F238E27FC236}">
+                <a16:creationId xmlns:a16="http://schemas.microsoft.com/office/drawing/2014/main" id="{656BE3A2-F5CD-1E4C-A4E5-57F0082299D5}"/>
+              </a:ext>
+            </a:extLst>
+          </p:cNvPr>
+          <p:cNvPicPr>
+            <a:picLocks noChangeAspect="1"/>
+          </p:cNvPicPr>
+          <p:nvPr/>
+        </p:nvPicPr>
+        <p:blipFill>
+          <a:blip r:embed="rId13"/>
+          <a:stretch>
+            <a:fillRect/>
+          </a:stretch>
+        </p:blipFill>
+        <p:spPr>
+          <a:xfrm>
+            <a:off x="179655" y="3147805"/>
+            <a:ext cx="1816007" cy="908004"/>
+          </a:xfrm>
+          <a:prstGeom prst="rect">
+            <a:avLst/>
+          </a:prstGeom>
+        </p:spPr>
+      </p:pic>
+      <p:pic>
+        <p:nvPicPr>
+          <p:cNvPr id="78" name="Picture 77">
+            <a:extLst>
+              <a:ext uri="{FF2B5EF4-FFF2-40B4-BE49-F238E27FC236}">
+                <a16:creationId xmlns:a16="http://schemas.microsoft.com/office/drawing/2014/main" id="{3509B459-C7A5-2441-BDCA-A873D66ADCC1}"/>
               </a:ext>
             </a:extLst>
           </p:cNvPr>
@@ -3469,8 +3968,8 @@
         </p:blipFill>
         <p:spPr>
           <a:xfrm>
-            <a:off x="254429" y="4012615"/>
-            <a:ext cx="1714500" cy="857250"/>
+            <a:off x="1972238" y="3146429"/>
+            <a:ext cx="1816007" cy="908004"/>
           </a:xfrm>
           <a:prstGeom prst="rect">
             <a:avLst/>
@@ -3479,10 +3978,10 @@
       </p:pic>
       <p:pic>
         <p:nvPicPr>
-          <p:cNvPr id="43" name="Picture 42">
+          <p:cNvPr id="80" name="Picture 79">
             <a:extLst>
               <a:ext uri="{FF2B5EF4-FFF2-40B4-BE49-F238E27FC236}">
-                <a16:creationId xmlns:a16="http://schemas.microsoft.com/office/drawing/2014/main" id="{06CA4F90-FE5C-0E46-990F-D32CEDC16F8E}"/>
+                <a16:creationId xmlns:a16="http://schemas.microsoft.com/office/drawing/2014/main" id="{FF0EB71E-CD0B-6649-9DDB-8DB65BE77EAF}"/>
               </a:ext>
             </a:extLst>
           </p:cNvPr>
@@ -3491,16 +3990,15 @@
           </p:cNvPicPr>
           <p:nvPr/>
         </p:nvPicPr>
-        <p:blipFill>
+        <p:blipFill rotWithShape="1">
           <a:blip r:embed="rId15"/>
-          <a:stretch>
-            <a:fillRect/>
-          </a:stretch>
+          <a:srcRect l="65581" r="12015"/>
+          <a:stretch/>
         </p:blipFill>
         <p:spPr>
           <a:xfrm>
-            <a:off x="2068986" y="4012615"/>
-            <a:ext cx="1714500" cy="857250"/>
+            <a:off x="3742866" y="3144717"/>
+            <a:ext cx="611414" cy="909716"/>
           </a:xfrm>
           <a:prstGeom prst="rect">
             <a:avLst/>
@@ -3509,10 +4007,10 @@
       </p:pic>
       <p:pic>
         <p:nvPicPr>
-          <p:cNvPr id="45" name="Picture 44">
+          <p:cNvPr id="82" name="Picture 81">
             <a:extLst>
               <a:ext uri="{FF2B5EF4-FFF2-40B4-BE49-F238E27FC236}">
-                <a16:creationId xmlns:a16="http://schemas.microsoft.com/office/drawing/2014/main" id="{0C248CC8-2DD5-4448-9F3A-B2E3DD7826C6}"/>
+                <a16:creationId xmlns:a16="http://schemas.microsoft.com/office/drawing/2014/main" id="{5DD0EC45-34F2-734B-9819-077C93297CCF}"/>
               </a:ext>
             </a:extLst>
           </p:cNvPr>
@@ -3529,8 +4027,8 @@
         </p:blipFill>
         <p:spPr>
           <a:xfrm>
-            <a:off x="3883542" y="4012615"/>
-            <a:ext cx="1371600" cy="857250"/>
+            <a:off x="209183" y="4047323"/>
+            <a:ext cx="1939657" cy="969829"/>
           </a:xfrm>
           <a:prstGeom prst="rect">
             <a:avLst/>
@@ -3539,10 +4037,10 @@
       </p:pic>
       <p:pic>
         <p:nvPicPr>
-          <p:cNvPr id="47" name="Picture 46">
+          <p:cNvPr id="84" name="Picture 83">
             <a:extLst>
               <a:ext uri="{FF2B5EF4-FFF2-40B4-BE49-F238E27FC236}">
-                <a16:creationId xmlns:a16="http://schemas.microsoft.com/office/drawing/2014/main" id="{97E407EE-0F75-3844-93CC-321D20F31393}"/>
+                <a16:creationId xmlns:a16="http://schemas.microsoft.com/office/drawing/2014/main" id="{DA769DF2-EE9A-8445-B1A1-F98FCE3F87F1}"/>
               </a:ext>
             </a:extLst>
           </p:cNvPr>
@@ -3559,8 +4057,8 @@
         </p:blipFill>
         <p:spPr>
           <a:xfrm>
-            <a:off x="5355198" y="4012615"/>
-            <a:ext cx="1371600" cy="857250"/>
+            <a:off x="1979450" y="4047324"/>
+            <a:ext cx="1939658" cy="969829"/>
           </a:xfrm>
           <a:prstGeom prst="rect">
             <a:avLst/>
@@ -3569,10 +4067,10 @@
       </p:pic>
       <p:pic>
         <p:nvPicPr>
-          <p:cNvPr id="49" name="Picture 48">
+          <p:cNvPr id="86" name="Picture 85">
             <a:extLst>
               <a:ext uri="{FF2B5EF4-FFF2-40B4-BE49-F238E27FC236}">
-                <a16:creationId xmlns:a16="http://schemas.microsoft.com/office/drawing/2014/main" id="{0E4D0842-C1EE-5746-AB18-8CFCC8AF3078}"/>
+                <a16:creationId xmlns:a16="http://schemas.microsoft.com/office/drawing/2014/main" id="{1C4840A0-3520-9043-961F-75535EA600F4}"/>
               </a:ext>
             </a:extLst>
           </p:cNvPr>
@@ -3581,16 +4079,15 @@
           </p:cNvPicPr>
           <p:nvPr/>
         </p:nvPicPr>
-        <p:blipFill>
+        <p:blipFill rotWithShape="1">
           <a:blip r:embed="rId18"/>
-          <a:stretch>
-            <a:fillRect/>
-          </a:stretch>
+          <a:srcRect l="59730" r="3861"/>
+          <a:stretch/>
         </p:blipFill>
         <p:spPr>
           <a:xfrm>
-            <a:off x="929213" y="5178695"/>
-            <a:ext cx="1714500" cy="857250"/>
+            <a:off x="3742866" y="4047323"/>
+            <a:ext cx="1059307" cy="969828"/>
           </a:xfrm>
           <a:prstGeom prst="rect">
             <a:avLst/>
@@ -3599,10 +4096,10 @@
       </p:pic>
       <p:pic>
         <p:nvPicPr>
-          <p:cNvPr id="51" name="Picture 50">
+          <p:cNvPr id="90" name="Picture 89">
             <a:extLst>
               <a:ext uri="{FF2B5EF4-FFF2-40B4-BE49-F238E27FC236}">
-                <a16:creationId xmlns:a16="http://schemas.microsoft.com/office/drawing/2014/main" id="{8AAE57CC-3D21-814C-865A-388827B96876}"/>
+                <a16:creationId xmlns:a16="http://schemas.microsoft.com/office/drawing/2014/main" id="{F5CFF0CE-3BC7-F249-81FA-10D1412AD211}"/>
               </a:ext>
             </a:extLst>
           </p:cNvPr>
@@ -3619,20 +4116,537 @@
         </p:blipFill>
         <p:spPr>
           <a:xfrm>
-            <a:off x="3185495" y="5092970"/>
-            <a:ext cx="2743200" cy="1028700"/>
+            <a:off x="196978" y="6612632"/>
+            <a:ext cx="3640742" cy="1365279"/>
           </a:xfrm>
           <a:prstGeom prst="rect">
             <a:avLst/>
           </a:prstGeom>
         </p:spPr>
       </p:pic>
+      <p:sp>
+        <p:nvSpPr>
+          <p:cNvPr id="63" name="TextBox 62">
+            <a:extLst>
+              <a:ext uri="{FF2B5EF4-FFF2-40B4-BE49-F238E27FC236}">
+                <a16:creationId xmlns:a16="http://schemas.microsoft.com/office/drawing/2014/main" id="{2AFA15FA-D233-B44F-952C-298AB1734600}"/>
+              </a:ext>
+            </a:extLst>
+          </p:cNvPr>
+          <p:cNvSpPr txBox="1"/>
+          <p:nvPr/>
+        </p:nvSpPr>
+        <p:spPr>
+          <a:xfrm>
+            <a:off x="35862" y="5142730"/>
+            <a:ext cx="242374" cy="215444"/>
+          </a:xfrm>
+          <a:prstGeom prst="rect">
+            <a:avLst/>
+          </a:prstGeom>
+          <a:noFill/>
+        </p:spPr>
+        <p:txBody>
+          <a:bodyPr wrap="none" rtlCol="0">
+            <a:spAutoFit/>
+          </a:bodyPr>
+          <a:lstStyle/>
+          <a:p>
+            <a:r>
+              <a:rPr lang="en-US" sz="800" dirty="0"/>
+              <a:t>f.</a:t>
+            </a:r>
+          </a:p>
+        </p:txBody>
+      </p:sp>
+    </p:spTree>
+    <p:extLst>
+      <p:ext uri="{BB962C8B-B14F-4D97-AF65-F5344CB8AC3E}">
+        <p14:creationId xmlns:p14="http://schemas.microsoft.com/office/powerpoint/2010/main" val="3334524794"/>
+      </p:ext>
+    </p:extLst>
+  </p:cSld>
+  <p:clrMapOvr>
+    <a:masterClrMapping/>
+  </p:clrMapOvr>
+</p:sld>
+</file>
+
+<file path=ppt/slides/slide2.xml><?xml version="1.0" encoding="utf-8"?>
+<p:sld xmlns:a="http://schemas.openxmlformats.org/drawingml/2006/main" xmlns:r="http://schemas.openxmlformats.org/officeDocument/2006/relationships" xmlns:p="http://schemas.openxmlformats.org/presentationml/2006/main">
+  <p:cSld>
+    <p:spTree>
+      <p:nvGrpSpPr>
+        <p:cNvPr id="1" name=""/>
+        <p:cNvGrpSpPr/>
+        <p:nvPr/>
+      </p:nvGrpSpPr>
+      <p:grpSpPr>
+        <a:xfrm>
+          <a:off x="0" y="0"/>
+          <a:ext cx="0" cy="0"/>
+          <a:chOff x="0" y="0"/>
+          <a:chExt cx="0" cy="0"/>
+        </a:xfrm>
+      </p:grpSpPr>
+      <p:grpSp>
+        <p:nvGrpSpPr>
+          <p:cNvPr id="4" name="Group 3">
+            <a:extLst>
+              <a:ext uri="{FF2B5EF4-FFF2-40B4-BE49-F238E27FC236}">
+                <a16:creationId xmlns:a16="http://schemas.microsoft.com/office/drawing/2014/main" id="{CAE810D6-8CC9-E946-A3F1-6A4D03BEFF8C}"/>
+              </a:ext>
+            </a:extLst>
+          </p:cNvPr>
+          <p:cNvGrpSpPr/>
+          <p:nvPr/>
+        </p:nvGrpSpPr>
+        <p:grpSpPr>
+          <a:xfrm>
+            <a:off x="770861" y="264295"/>
+            <a:ext cx="5143500" cy="1371600"/>
+            <a:chOff x="851632" y="1423312"/>
+            <a:chExt cx="5143500" cy="1371600"/>
+          </a:xfrm>
+        </p:grpSpPr>
+        <p:pic>
+          <p:nvPicPr>
+            <p:cNvPr id="5" name="Picture 4">
+              <a:extLst>
+                <a:ext uri="{FF2B5EF4-FFF2-40B4-BE49-F238E27FC236}">
+                  <a16:creationId xmlns:a16="http://schemas.microsoft.com/office/drawing/2014/main" id="{712DB57C-932B-DA4E-A446-50C0D03CE0CB}"/>
+                </a:ext>
+              </a:extLst>
+            </p:cNvPr>
+            <p:cNvPicPr>
+              <a:picLocks noChangeAspect="1"/>
+            </p:cNvPicPr>
+            <p:nvPr/>
+          </p:nvPicPr>
+          <p:blipFill>
+            <a:blip r:embed="rId2"/>
+            <a:stretch>
+              <a:fillRect/>
+            </a:stretch>
+          </p:blipFill>
+          <p:spPr>
+            <a:xfrm>
+              <a:off x="851632" y="1423312"/>
+              <a:ext cx="2571750" cy="1371600"/>
+            </a:xfrm>
+            <a:prstGeom prst="rect">
+              <a:avLst/>
+            </a:prstGeom>
+          </p:spPr>
+        </p:pic>
+        <p:pic>
+          <p:nvPicPr>
+            <p:cNvPr id="6" name="Picture 5">
+              <a:extLst>
+                <a:ext uri="{FF2B5EF4-FFF2-40B4-BE49-F238E27FC236}">
+                  <a16:creationId xmlns:a16="http://schemas.microsoft.com/office/drawing/2014/main" id="{B6949EDC-2981-FD48-BA77-82954FA9F65A}"/>
+                </a:ext>
+              </a:extLst>
+            </p:cNvPr>
+            <p:cNvPicPr>
+              <a:picLocks noChangeAspect="1"/>
+            </p:cNvPicPr>
+            <p:nvPr/>
+          </p:nvPicPr>
+          <p:blipFill>
+            <a:blip r:embed="rId3"/>
+            <a:stretch>
+              <a:fillRect/>
+            </a:stretch>
+          </p:blipFill>
+          <p:spPr>
+            <a:xfrm>
+              <a:off x="3423382" y="1423312"/>
+              <a:ext cx="2571750" cy="1371600"/>
+            </a:xfrm>
+            <a:prstGeom prst="rect">
+              <a:avLst/>
+            </a:prstGeom>
+          </p:spPr>
+        </p:pic>
+      </p:grpSp>
+      <p:grpSp>
+        <p:nvGrpSpPr>
+          <p:cNvPr id="14" name="Group 13">
+            <a:extLst>
+              <a:ext uri="{FF2B5EF4-FFF2-40B4-BE49-F238E27FC236}">
+                <a16:creationId xmlns:a16="http://schemas.microsoft.com/office/drawing/2014/main" id="{343752A2-1307-9943-822C-23D281320909}"/>
+              </a:ext>
+            </a:extLst>
+          </p:cNvPr>
+          <p:cNvGrpSpPr/>
+          <p:nvPr/>
+        </p:nvGrpSpPr>
+        <p:grpSpPr>
+          <a:xfrm>
+            <a:off x="407836" y="1635895"/>
+            <a:ext cx="6042328" cy="2269701"/>
+            <a:chOff x="190131" y="1660459"/>
+            <a:chExt cx="6042328" cy="2269701"/>
+          </a:xfrm>
+        </p:grpSpPr>
+        <p:pic>
+          <p:nvPicPr>
+            <p:cNvPr id="7" name="Picture 6">
+              <a:extLst>
+                <a:ext uri="{FF2B5EF4-FFF2-40B4-BE49-F238E27FC236}">
+                  <a16:creationId xmlns:a16="http://schemas.microsoft.com/office/drawing/2014/main" id="{E2B5964B-2B1B-2941-8CDF-3E605FAD4A3A}"/>
+                </a:ext>
+              </a:extLst>
+            </p:cNvPr>
+            <p:cNvPicPr>
+              <a:picLocks noChangeAspect="1"/>
+            </p:cNvPicPr>
+            <p:nvPr/>
+          </p:nvPicPr>
+          <p:blipFill>
+            <a:blip r:embed="rId4"/>
+            <a:stretch>
+              <a:fillRect/>
+            </a:stretch>
+          </p:blipFill>
+          <p:spPr>
+            <a:xfrm>
+              <a:off x="190131" y="2822078"/>
+              <a:ext cx="1819423" cy="909712"/>
+            </a:xfrm>
+            <a:prstGeom prst="rect">
+              <a:avLst/>
+            </a:prstGeom>
+          </p:spPr>
+        </p:pic>
+        <p:pic>
+          <p:nvPicPr>
+            <p:cNvPr id="8" name="Picture 7">
+              <a:extLst>
+                <a:ext uri="{FF2B5EF4-FFF2-40B4-BE49-F238E27FC236}">
+                  <a16:creationId xmlns:a16="http://schemas.microsoft.com/office/drawing/2014/main" id="{8C96AC8C-F642-B542-A2D1-E1E6D5DEFF69}"/>
+                </a:ext>
+              </a:extLst>
+            </p:cNvPr>
+            <p:cNvPicPr>
+              <a:picLocks noChangeAspect="1"/>
+            </p:cNvPicPr>
+            <p:nvPr/>
+          </p:nvPicPr>
+          <p:blipFill>
+            <a:blip r:embed="rId5"/>
+            <a:stretch>
+              <a:fillRect/>
+            </a:stretch>
+          </p:blipFill>
+          <p:spPr>
+            <a:xfrm>
+              <a:off x="190131" y="1742094"/>
+              <a:ext cx="1819423" cy="909712"/>
+            </a:xfrm>
+            <a:prstGeom prst="rect">
+              <a:avLst/>
+            </a:prstGeom>
+          </p:spPr>
+        </p:pic>
+        <p:pic>
+          <p:nvPicPr>
+            <p:cNvPr id="9" name="Picture 8">
+              <a:extLst>
+                <a:ext uri="{FF2B5EF4-FFF2-40B4-BE49-F238E27FC236}">
+                  <a16:creationId xmlns:a16="http://schemas.microsoft.com/office/drawing/2014/main" id="{39B0A0E3-E6BF-2849-B757-33B4D4F41CD4}"/>
+                </a:ext>
+              </a:extLst>
+            </p:cNvPr>
+            <p:cNvPicPr>
+              <a:picLocks noChangeAspect="1"/>
+            </p:cNvPicPr>
+            <p:nvPr/>
+          </p:nvPicPr>
+          <p:blipFill>
+            <a:blip r:embed="rId6"/>
+            <a:stretch>
+              <a:fillRect/>
+            </a:stretch>
+          </p:blipFill>
+          <p:spPr>
+            <a:xfrm>
+              <a:off x="2056736" y="2795156"/>
+              <a:ext cx="1816006" cy="1135004"/>
+            </a:xfrm>
+            <a:prstGeom prst="rect">
+              <a:avLst/>
+            </a:prstGeom>
+          </p:spPr>
+        </p:pic>
+        <p:pic>
+          <p:nvPicPr>
+            <p:cNvPr id="10" name="Picture 9">
+              <a:extLst>
+                <a:ext uri="{FF2B5EF4-FFF2-40B4-BE49-F238E27FC236}">
+                  <a16:creationId xmlns:a16="http://schemas.microsoft.com/office/drawing/2014/main" id="{9611E306-F979-4B44-813B-6AC35AF15C14}"/>
+                </a:ext>
+              </a:extLst>
+            </p:cNvPr>
+            <p:cNvPicPr>
+              <a:picLocks noChangeAspect="1"/>
+            </p:cNvPicPr>
+            <p:nvPr/>
+          </p:nvPicPr>
+          <p:blipFill>
+            <a:blip r:embed="rId7"/>
+            <a:stretch>
+              <a:fillRect/>
+            </a:stretch>
+          </p:blipFill>
+          <p:spPr>
+            <a:xfrm>
+              <a:off x="2056736" y="1660459"/>
+              <a:ext cx="1816006" cy="1135003"/>
+            </a:xfrm>
+            <a:prstGeom prst="rect">
+              <a:avLst/>
+            </a:prstGeom>
+          </p:spPr>
+        </p:pic>
+        <p:pic>
+          <p:nvPicPr>
+            <p:cNvPr id="11" name="Picture 10">
+              <a:extLst>
+                <a:ext uri="{FF2B5EF4-FFF2-40B4-BE49-F238E27FC236}">
+                  <a16:creationId xmlns:a16="http://schemas.microsoft.com/office/drawing/2014/main" id="{0370DF8E-89CF-4B44-A6B6-812EE1DA2D0E}"/>
+                </a:ext>
+              </a:extLst>
+            </p:cNvPr>
+            <p:cNvPicPr>
+              <a:picLocks noChangeAspect="1"/>
+            </p:cNvPicPr>
+            <p:nvPr/>
+          </p:nvPicPr>
+          <p:blipFill>
+            <a:blip r:embed="rId8"/>
+            <a:stretch>
+              <a:fillRect/>
+            </a:stretch>
+          </p:blipFill>
+          <p:spPr>
+            <a:xfrm>
+              <a:off x="3919924" y="1715172"/>
+              <a:ext cx="2312535" cy="963556"/>
+            </a:xfrm>
+            <a:prstGeom prst="rect">
+              <a:avLst/>
+            </a:prstGeom>
+          </p:spPr>
+        </p:pic>
+        <p:pic>
+          <p:nvPicPr>
+            <p:cNvPr id="12" name="Picture 11">
+              <a:extLst>
+                <a:ext uri="{FF2B5EF4-FFF2-40B4-BE49-F238E27FC236}">
+                  <a16:creationId xmlns:a16="http://schemas.microsoft.com/office/drawing/2014/main" id="{9A4F8BFC-D3E0-7446-9AEB-6D7366C42E9A}"/>
+                </a:ext>
+              </a:extLst>
+            </p:cNvPr>
+            <p:cNvPicPr>
+              <a:picLocks noChangeAspect="1"/>
+            </p:cNvPicPr>
+            <p:nvPr/>
+          </p:nvPicPr>
+          <p:blipFill>
+            <a:blip r:embed="rId9"/>
+            <a:stretch>
+              <a:fillRect/>
+            </a:stretch>
+          </p:blipFill>
+          <p:spPr>
+            <a:xfrm>
+              <a:off x="3919924" y="2880880"/>
+              <a:ext cx="2312535" cy="963556"/>
+            </a:xfrm>
+            <a:prstGeom prst="rect">
+              <a:avLst/>
+            </a:prstGeom>
+          </p:spPr>
+        </p:pic>
+      </p:grpSp>
+      <p:sp>
+        <p:nvSpPr>
+          <p:cNvPr id="13" name="TextBox 12">
+            <a:extLst>
+              <a:ext uri="{FF2B5EF4-FFF2-40B4-BE49-F238E27FC236}">
+                <a16:creationId xmlns:a16="http://schemas.microsoft.com/office/drawing/2014/main" id="{8229808F-4CC0-9247-B070-CF63259DF83F}"/>
+              </a:ext>
+            </a:extLst>
+          </p:cNvPr>
+          <p:cNvSpPr txBox="1"/>
+          <p:nvPr/>
+        </p:nvSpPr>
+        <p:spPr>
+          <a:xfrm>
+            <a:off x="770861" y="158096"/>
+            <a:ext cx="260008" cy="215444"/>
+          </a:xfrm>
+          <a:prstGeom prst="rect">
+            <a:avLst/>
+          </a:prstGeom>
+          <a:noFill/>
+        </p:spPr>
+        <p:txBody>
+          <a:bodyPr wrap="none" rtlCol="0">
+            <a:spAutoFit/>
+          </a:bodyPr>
+          <a:lstStyle/>
+          <a:p>
+            <a:r>
+              <a:rPr lang="en-US" sz="800" dirty="0"/>
+              <a:t>a.</a:t>
+            </a:r>
+          </a:p>
+        </p:txBody>
+      </p:sp>
+      <p:sp>
+        <p:nvSpPr>
+          <p:cNvPr id="15" name="TextBox 14">
+            <a:extLst>
+              <a:ext uri="{FF2B5EF4-FFF2-40B4-BE49-F238E27FC236}">
+                <a16:creationId xmlns:a16="http://schemas.microsoft.com/office/drawing/2014/main" id="{39023FF2-A5AB-EC48-AAF3-83F2D549BBF7}"/>
+              </a:ext>
+            </a:extLst>
+          </p:cNvPr>
+          <p:cNvSpPr txBox="1"/>
+          <p:nvPr/>
+        </p:nvSpPr>
+        <p:spPr>
+          <a:xfrm>
+            <a:off x="360654" y="1583232"/>
+            <a:ext cx="264816" cy="215444"/>
+          </a:xfrm>
+          <a:prstGeom prst="rect">
+            <a:avLst/>
+          </a:prstGeom>
+          <a:noFill/>
+        </p:spPr>
+        <p:txBody>
+          <a:bodyPr wrap="none" rtlCol="0">
+            <a:spAutoFit/>
+          </a:bodyPr>
+          <a:lstStyle/>
+          <a:p>
+            <a:r>
+              <a:rPr lang="en-US" sz="800" dirty="0"/>
+              <a:t>b.</a:t>
+            </a:r>
+          </a:p>
+        </p:txBody>
+      </p:sp>
+      <p:sp>
+        <p:nvSpPr>
+          <p:cNvPr id="16" name="TextBox 15">
+            <a:extLst>
+              <a:ext uri="{FF2B5EF4-FFF2-40B4-BE49-F238E27FC236}">
+                <a16:creationId xmlns:a16="http://schemas.microsoft.com/office/drawing/2014/main" id="{BA995C43-D33E-E64F-A2C8-E2E03A461520}"/>
+              </a:ext>
+            </a:extLst>
+          </p:cNvPr>
+          <p:cNvSpPr txBox="1"/>
+          <p:nvPr/>
+        </p:nvSpPr>
+        <p:spPr>
+          <a:xfrm>
+            <a:off x="2203953" y="1609808"/>
+            <a:ext cx="253596" cy="215444"/>
+          </a:xfrm>
+          <a:prstGeom prst="rect">
+            <a:avLst/>
+          </a:prstGeom>
+          <a:noFill/>
+        </p:spPr>
+        <p:txBody>
+          <a:bodyPr wrap="none" rtlCol="0">
+            <a:spAutoFit/>
+          </a:bodyPr>
+          <a:lstStyle/>
+          <a:p>
+            <a:r>
+              <a:rPr lang="en-US" sz="800" dirty="0"/>
+              <a:t>c.</a:t>
+            </a:r>
+          </a:p>
+        </p:txBody>
+      </p:sp>
+      <p:sp>
+        <p:nvSpPr>
+          <p:cNvPr id="17" name="TextBox 16">
+            <a:extLst>
+              <a:ext uri="{FF2B5EF4-FFF2-40B4-BE49-F238E27FC236}">
+                <a16:creationId xmlns:a16="http://schemas.microsoft.com/office/drawing/2014/main" id="{DEC71DD1-327F-F843-83B9-B8240A2DD286}"/>
+              </a:ext>
+            </a:extLst>
+          </p:cNvPr>
+          <p:cNvSpPr txBox="1"/>
+          <p:nvPr/>
+        </p:nvSpPr>
+        <p:spPr>
+          <a:xfrm>
+            <a:off x="4034137" y="1583232"/>
+            <a:ext cx="264816" cy="215444"/>
+          </a:xfrm>
+          <a:prstGeom prst="rect">
+            <a:avLst/>
+          </a:prstGeom>
+          <a:noFill/>
+        </p:spPr>
+        <p:txBody>
+          <a:bodyPr wrap="none" rtlCol="0">
+            <a:spAutoFit/>
+          </a:bodyPr>
+          <a:lstStyle/>
+          <a:p>
+            <a:r>
+              <a:rPr lang="en-US" sz="800" dirty="0"/>
+              <a:t>d.</a:t>
+            </a:r>
+          </a:p>
+        </p:txBody>
+      </p:sp>
+    </p:spTree>
+    <p:extLst>
+      <p:ext uri="{BB962C8B-B14F-4D97-AF65-F5344CB8AC3E}">
+        <p14:creationId xmlns:p14="http://schemas.microsoft.com/office/powerpoint/2010/main" val="2110817669"/>
+      </p:ext>
+    </p:extLst>
+  </p:cSld>
+  <p:clrMapOvr>
+    <a:masterClrMapping/>
+  </p:clrMapOvr>
+</p:sld>
+</file>
+
+<file path=ppt/slides/slide3.xml><?xml version="1.0" encoding="utf-8"?>
+<p:sld xmlns:a="http://schemas.openxmlformats.org/drawingml/2006/main" xmlns:r="http://schemas.openxmlformats.org/officeDocument/2006/relationships" xmlns:p="http://schemas.openxmlformats.org/presentationml/2006/main">
+  <p:cSld>
+    <p:spTree>
+      <p:nvGrpSpPr>
+        <p:cNvPr id="1" name=""/>
+        <p:cNvGrpSpPr/>
+        <p:nvPr/>
+      </p:nvGrpSpPr>
+      <p:grpSpPr>
+        <a:xfrm>
+          <a:off x="0" y="0"/>
+          <a:ext cx="0" cy="0"/>
+          <a:chOff x="0" y="0"/>
+          <a:chExt cx="0" cy="0"/>
+        </a:xfrm>
+      </p:grpSpPr>
       <p:pic>
         <p:nvPicPr>
-          <p:cNvPr id="57" name="Picture 56">
+          <p:cNvPr id="5" name="Picture 4" descr="A picture containing sitting, computer, laptop, fence&#10;&#10;Description automatically generated">
             <a:extLst>
               <a:ext uri="{FF2B5EF4-FFF2-40B4-BE49-F238E27FC236}">
-                <a16:creationId xmlns:a16="http://schemas.microsoft.com/office/drawing/2014/main" id="{4AE523F6-8651-4B49-9D2A-14DA00030CAA}"/>
+                <a16:creationId xmlns:a16="http://schemas.microsoft.com/office/drawing/2014/main" id="{BF99038A-811C-7E4C-B1E2-77B6C20517E1}"/>
               </a:ext>
             </a:extLst>
           </p:cNvPr>
@@ -3642,15 +4656,15 @@
           <p:nvPr/>
         </p:nvPicPr>
         <p:blipFill>
-          <a:blip r:embed="rId20"/>
+          <a:blip r:embed="rId2"/>
           <a:stretch>
             <a:fillRect/>
           </a:stretch>
         </p:blipFill>
         <p:spPr>
           <a:xfrm>
-            <a:off x="1114425" y="6344776"/>
-            <a:ext cx="2057400" cy="857250"/>
+            <a:off x="1372929" y="0"/>
+            <a:ext cx="4112142" cy="2056071"/>
           </a:xfrm>
           <a:prstGeom prst="rect">
             <a:avLst/>
@@ -3659,10 +4673,10 @@
       </p:pic>
       <p:pic>
         <p:nvPicPr>
-          <p:cNvPr id="59" name="Picture 58">
+          <p:cNvPr id="16" name="Picture 15" descr="A close up of a logo&#10;&#10;Description automatically generated">
             <a:extLst>
               <a:ext uri="{FF2B5EF4-FFF2-40B4-BE49-F238E27FC236}">
-                <a16:creationId xmlns:a16="http://schemas.microsoft.com/office/drawing/2014/main" id="{5B78B6D9-FDBC-B744-86FA-F0DE2EA841D4}"/>
+                <a16:creationId xmlns:a16="http://schemas.microsoft.com/office/drawing/2014/main" id="{B18C2827-7412-754D-BF86-73BB2558E2FD}"/>
               </a:ext>
             </a:extLst>
           </p:cNvPr>
@@ -3672,27 +4686,87 @@
           <p:nvPr/>
         </p:nvPicPr>
         <p:blipFill>
-          <a:blip r:embed="rId21"/>
+          <a:blip r:embed="rId3"/>
           <a:stretch>
             <a:fillRect/>
           </a:stretch>
         </p:blipFill>
         <p:spPr>
           <a:xfrm>
-            <a:off x="3686175" y="6344776"/>
-            <a:ext cx="2057400" cy="857250"/>
+            <a:off x="1372925" y="2135078"/>
+            <a:ext cx="4112144" cy="2056073"/>
           </a:xfrm>
           <a:prstGeom prst="rect">
             <a:avLst/>
           </a:prstGeom>
         </p:spPr>
       </p:pic>
-      <p:sp>
-        <p:nvSpPr>
-          <p:cNvPr id="60" name="TextBox 59">
+      <p:pic>
+        <p:nvPicPr>
+          <p:cNvPr id="18" name="Picture 17" descr="A close up of a logo&#10;&#10;Description automatically generated">
             <a:extLst>
               <a:ext uri="{FF2B5EF4-FFF2-40B4-BE49-F238E27FC236}">
-                <a16:creationId xmlns:a16="http://schemas.microsoft.com/office/drawing/2014/main" id="{D1884A7C-E883-5646-96A9-B3A2F9C6DA29}"/>
+                <a16:creationId xmlns:a16="http://schemas.microsoft.com/office/drawing/2014/main" id="{B0E4FA04-3BE5-9540-B8BE-DEAC9C3D51C0}"/>
+              </a:ext>
+            </a:extLst>
+          </p:cNvPr>
+          <p:cNvPicPr>
+            <a:picLocks noChangeAspect="1"/>
+          </p:cNvPicPr>
+          <p:nvPr/>
+        </p:nvPicPr>
+        <p:blipFill>
+          <a:blip r:embed="rId4"/>
+          <a:stretch>
+            <a:fillRect/>
+          </a:stretch>
+        </p:blipFill>
+        <p:spPr>
+          <a:xfrm>
+            <a:off x="1372927" y="6405237"/>
+            <a:ext cx="4112142" cy="2056071"/>
+          </a:xfrm>
+          <a:prstGeom prst="rect">
+            <a:avLst/>
+          </a:prstGeom>
+        </p:spPr>
+      </p:pic>
+      <p:pic>
+        <p:nvPicPr>
+          <p:cNvPr id="22" name="Picture 21" descr="A close up of a logo&#10;&#10;Description automatically generated">
+            <a:extLst>
+              <a:ext uri="{FF2B5EF4-FFF2-40B4-BE49-F238E27FC236}">
+                <a16:creationId xmlns:a16="http://schemas.microsoft.com/office/drawing/2014/main" id="{925562AB-1E5F-3E45-ADC2-ECBD27477682}"/>
+              </a:ext>
+            </a:extLst>
+          </p:cNvPr>
+          <p:cNvPicPr>
+            <a:picLocks noChangeAspect="1"/>
+          </p:cNvPicPr>
+          <p:nvPr/>
+        </p:nvPicPr>
+        <p:blipFill>
+          <a:blip r:embed="rId5"/>
+          <a:stretch>
+            <a:fillRect/>
+          </a:stretch>
+        </p:blipFill>
+        <p:spPr>
+          <a:xfrm>
+            <a:off x="1372925" y="4270158"/>
+            <a:ext cx="4112144" cy="2056072"/>
+          </a:xfrm>
+          <a:prstGeom prst="rect">
+            <a:avLst/>
+          </a:prstGeom>
+        </p:spPr>
+      </p:pic>
+      <p:sp>
+        <p:nvSpPr>
+          <p:cNvPr id="24" name="TextBox 23">
+            <a:extLst>
+              <a:ext uri="{FF2B5EF4-FFF2-40B4-BE49-F238E27FC236}">
+                <a16:creationId xmlns:a16="http://schemas.microsoft.com/office/drawing/2014/main" id="{D04882C2-E4F6-1048-A947-1345CA52402A}"/>
               </a:ext>
             </a:extLst>
           </p:cNvPr>
@@ -3701,8 +4775,8 @@
         </p:nvSpPr>
         <p:spPr>
           <a:xfrm>
-            <a:off x="1056338" y="393748"/>
-            <a:ext cx="260008" cy="215444"/>
+            <a:off x="2983202" y="2011967"/>
+            <a:ext cx="891590" cy="246221"/>
           </a:xfrm>
           <a:prstGeom prst="rect">
             <a:avLst/>
@@ -3715,19 +4789,20 @@
           </a:bodyPr>
           <a:lstStyle/>
           <a:p>
-            <a:r>
-              <a:rPr lang="en-US" sz="800" dirty="0"/>
-              <a:t>a.</a:t>
-            </a:r>
-          </a:p>
-        </p:txBody>
-      </p:sp>
-      <p:sp>
-        <p:nvSpPr>
-          <p:cNvPr id="61" name="TextBox 60">
+            <a:pPr algn="ctr"/>
+            <a:r>
+              <a:rPr lang="en-US" sz="1000" dirty="0"/>
+              <a:t>Spaced Seeds</a:t>
+            </a:r>
+          </a:p>
+        </p:txBody>
+      </p:sp>
+      <p:sp>
+        <p:nvSpPr>
+          <p:cNvPr id="25" name="TextBox 24">
             <a:extLst>
               <a:ext uri="{FF2B5EF4-FFF2-40B4-BE49-F238E27FC236}">
-                <a16:creationId xmlns:a16="http://schemas.microsoft.com/office/drawing/2014/main" id="{959710E7-0ED0-5740-A8DD-C96A1A82BC0C}"/>
+                <a16:creationId xmlns:a16="http://schemas.microsoft.com/office/drawing/2014/main" id="{AB15BE79-AB8B-3545-825C-3B46B12ECAF7}"/>
               </a:ext>
             </a:extLst>
           </p:cNvPr>
@@ -3736,8 +4811,8 @@
         </p:nvSpPr>
         <p:spPr>
           <a:xfrm>
-            <a:off x="3628180" y="393748"/>
-            <a:ext cx="264816" cy="215444"/>
+            <a:off x="2838935" y="4147044"/>
+            <a:ext cx="1180131" cy="246221"/>
           </a:xfrm>
           <a:prstGeom prst="rect">
             <a:avLst/>
@@ -3750,19 +4825,20 @@
           </a:bodyPr>
           <a:lstStyle/>
           <a:p>
-            <a:r>
-              <a:rPr lang="en-US" sz="800" dirty="0"/>
-              <a:t>b.</a:t>
-            </a:r>
-          </a:p>
-        </p:txBody>
-      </p:sp>
-      <p:sp>
-        <p:nvSpPr>
-          <p:cNvPr id="62" name="TextBox 61">
+            <a:pPr algn="ctr"/>
+            <a:r>
+              <a:rPr lang="en-US" sz="1000" dirty="0"/>
+              <a:t>Fixed Length Seeds</a:t>
+            </a:r>
+          </a:p>
+        </p:txBody>
+      </p:sp>
+      <p:sp>
+        <p:nvSpPr>
+          <p:cNvPr id="26" name="TextBox 25">
             <a:extLst>
               <a:ext uri="{FF2B5EF4-FFF2-40B4-BE49-F238E27FC236}">
-                <a16:creationId xmlns:a16="http://schemas.microsoft.com/office/drawing/2014/main" id="{12A1E8A6-19B2-F845-8662-D895E33D27A0}"/>
+                <a16:creationId xmlns:a16="http://schemas.microsoft.com/office/drawing/2014/main" id="{C1D70D36-527A-B646-9E3B-12A1C2D5C952}"/>
               </a:ext>
             </a:extLst>
           </p:cNvPr>
@@ -3771,8 +4847,8 @@
         </p:nvSpPr>
         <p:spPr>
           <a:xfrm>
-            <a:off x="279967" y="1309852"/>
-            <a:ext cx="253596" cy="215444"/>
+            <a:off x="2957558" y="6282121"/>
+            <a:ext cx="942887" cy="246221"/>
           </a:xfrm>
           <a:prstGeom prst="rect">
             <a:avLst/>
@@ -3785,289 +4861,10 @@
           </a:bodyPr>
           <a:lstStyle/>
           <a:p>
-            <a:r>
-              <a:rPr lang="en-US" sz="800" dirty="0"/>
-              <a:t>c.</a:t>
-            </a:r>
-          </a:p>
-        </p:txBody>
-      </p:sp>
-      <p:sp>
-        <p:nvSpPr>
-          <p:cNvPr id="63" name="TextBox 62">
-            <a:extLst>
-              <a:ext uri="{FF2B5EF4-FFF2-40B4-BE49-F238E27FC236}">
-                <a16:creationId xmlns:a16="http://schemas.microsoft.com/office/drawing/2014/main" id="{2AFA15FA-D233-B44F-952C-298AB1734600}"/>
-              </a:ext>
-            </a:extLst>
-          </p:cNvPr>
-          <p:cNvSpPr txBox="1"/>
-          <p:nvPr/>
-        </p:nvSpPr>
-        <p:spPr>
-          <a:xfrm>
-            <a:off x="2438783" y="1309852"/>
-            <a:ext cx="264816" cy="215444"/>
-          </a:xfrm>
-          <a:prstGeom prst="rect">
-            <a:avLst/>
-          </a:prstGeom>
-          <a:noFill/>
-        </p:spPr>
-        <p:txBody>
-          <a:bodyPr wrap="none" rtlCol="0">
-            <a:spAutoFit/>
-          </a:bodyPr>
-          <a:lstStyle/>
-          <a:p>
-            <a:r>
-              <a:rPr lang="en-US" sz="800" dirty="0"/>
-              <a:t>d.</a:t>
-            </a:r>
-          </a:p>
-        </p:txBody>
-      </p:sp>
-      <p:sp>
-        <p:nvSpPr>
-          <p:cNvPr id="64" name="TextBox 63">
-            <a:extLst>
-              <a:ext uri="{FF2B5EF4-FFF2-40B4-BE49-F238E27FC236}">
-                <a16:creationId xmlns:a16="http://schemas.microsoft.com/office/drawing/2014/main" id="{382AA67B-6F5A-4C44-A4A2-8EB06B6E4A0C}"/>
-              </a:ext>
-            </a:extLst>
-          </p:cNvPr>
-          <p:cNvSpPr txBox="1"/>
-          <p:nvPr/>
-        </p:nvSpPr>
-        <p:spPr>
-          <a:xfrm>
-            <a:off x="4608819" y="1309852"/>
-            <a:ext cx="261610" cy="215444"/>
-          </a:xfrm>
-          <a:prstGeom prst="rect">
-            <a:avLst/>
-          </a:prstGeom>
-          <a:noFill/>
-        </p:spPr>
-        <p:txBody>
-          <a:bodyPr wrap="none" rtlCol="0">
-            <a:spAutoFit/>
-          </a:bodyPr>
-          <a:lstStyle/>
-          <a:p>
-            <a:r>
-              <a:rPr lang="en-US" sz="800" dirty="0"/>
-              <a:t>e.</a:t>
-            </a:r>
-          </a:p>
-        </p:txBody>
-      </p:sp>
-      <p:sp>
-        <p:nvSpPr>
-          <p:cNvPr id="65" name="TextBox 64">
-            <a:extLst>
-              <a:ext uri="{FF2B5EF4-FFF2-40B4-BE49-F238E27FC236}">
-                <a16:creationId xmlns:a16="http://schemas.microsoft.com/office/drawing/2014/main" id="{A7E77559-ADD4-B348-A095-D2316267DF49}"/>
-              </a:ext>
-            </a:extLst>
-          </p:cNvPr>
-          <p:cNvSpPr txBox="1"/>
-          <p:nvPr/>
-        </p:nvSpPr>
-        <p:spPr>
-          <a:xfrm>
-            <a:off x="1034970" y="2318284"/>
-            <a:ext cx="242374" cy="215444"/>
-          </a:xfrm>
-          <a:prstGeom prst="rect">
-            <a:avLst/>
-          </a:prstGeom>
-          <a:noFill/>
-        </p:spPr>
-        <p:txBody>
-          <a:bodyPr wrap="none" rtlCol="0">
-            <a:spAutoFit/>
-          </a:bodyPr>
-          <a:lstStyle/>
-          <a:p>
-            <a:r>
-              <a:rPr lang="en-US" sz="800" dirty="0"/>
-              <a:t>f.</a:t>
-            </a:r>
-          </a:p>
-        </p:txBody>
-      </p:sp>
-      <p:sp>
-        <p:nvSpPr>
-          <p:cNvPr id="66" name="TextBox 65">
-            <a:extLst>
-              <a:ext uri="{FF2B5EF4-FFF2-40B4-BE49-F238E27FC236}">
-                <a16:creationId xmlns:a16="http://schemas.microsoft.com/office/drawing/2014/main" id="{74F5062A-9F77-3441-8D09-F213BE07429F}"/>
-              </a:ext>
-            </a:extLst>
-          </p:cNvPr>
-          <p:cNvSpPr txBox="1"/>
-          <p:nvPr/>
-        </p:nvSpPr>
-        <p:spPr>
-          <a:xfrm>
-            <a:off x="279967" y="3797171"/>
-            <a:ext cx="258404" cy="215444"/>
-          </a:xfrm>
-          <a:prstGeom prst="rect">
-            <a:avLst/>
-          </a:prstGeom>
-          <a:noFill/>
-        </p:spPr>
-        <p:txBody>
-          <a:bodyPr wrap="none" rtlCol="0">
-            <a:spAutoFit/>
-          </a:bodyPr>
-          <a:lstStyle/>
-          <a:p>
-            <a:r>
-              <a:rPr lang="en-US" sz="800" dirty="0"/>
-              <a:t>g.</a:t>
-            </a:r>
-          </a:p>
-        </p:txBody>
-      </p:sp>
-      <p:sp>
-        <p:nvSpPr>
-          <p:cNvPr id="68" name="TextBox 67">
-            <a:extLst>
-              <a:ext uri="{FF2B5EF4-FFF2-40B4-BE49-F238E27FC236}">
-                <a16:creationId xmlns:a16="http://schemas.microsoft.com/office/drawing/2014/main" id="{C657FBFA-2750-A74F-B51B-3B84243C3A71}"/>
-              </a:ext>
-            </a:extLst>
-          </p:cNvPr>
-          <p:cNvSpPr txBox="1"/>
-          <p:nvPr/>
-        </p:nvSpPr>
-        <p:spPr>
-          <a:xfrm>
-            <a:off x="3883542" y="3797171"/>
-            <a:ext cx="264816" cy="215444"/>
-          </a:xfrm>
-          <a:prstGeom prst="rect">
-            <a:avLst/>
-          </a:prstGeom>
-          <a:noFill/>
-        </p:spPr>
-        <p:txBody>
-          <a:bodyPr wrap="none" rtlCol="0">
-            <a:spAutoFit/>
-          </a:bodyPr>
-          <a:lstStyle/>
-          <a:p>
-            <a:r>
-              <a:rPr lang="en-US" sz="800" dirty="0"/>
-              <a:t>h.</a:t>
-            </a:r>
-          </a:p>
-        </p:txBody>
-      </p:sp>
-      <p:sp>
-        <p:nvSpPr>
-          <p:cNvPr id="69" name="TextBox 68">
-            <a:extLst>
-              <a:ext uri="{FF2B5EF4-FFF2-40B4-BE49-F238E27FC236}">
-                <a16:creationId xmlns:a16="http://schemas.microsoft.com/office/drawing/2014/main" id="{26914B62-B81F-2946-882F-0EFE8AA1E4D0}"/>
-              </a:ext>
-            </a:extLst>
-          </p:cNvPr>
-          <p:cNvSpPr txBox="1"/>
-          <p:nvPr/>
-        </p:nvSpPr>
-        <p:spPr>
-          <a:xfrm>
-            <a:off x="951982" y="4963251"/>
-            <a:ext cx="234360" cy="215444"/>
-          </a:xfrm>
-          <a:prstGeom prst="rect">
-            <a:avLst/>
-          </a:prstGeom>
-          <a:noFill/>
-        </p:spPr>
-        <p:txBody>
-          <a:bodyPr wrap="none" rtlCol="0">
-            <a:spAutoFit/>
-          </a:bodyPr>
-          <a:lstStyle/>
-          <a:p>
-            <a:r>
-              <a:rPr lang="en-US" sz="800" dirty="0"/>
-              <a:t>i.</a:t>
-            </a:r>
-          </a:p>
-        </p:txBody>
-      </p:sp>
-      <p:sp>
-        <p:nvSpPr>
-          <p:cNvPr id="70" name="TextBox 69">
-            <a:extLst>
-              <a:ext uri="{FF2B5EF4-FFF2-40B4-BE49-F238E27FC236}">
-                <a16:creationId xmlns:a16="http://schemas.microsoft.com/office/drawing/2014/main" id="{04CA43FB-0001-D248-AC74-F0AE04EDE44B}"/>
-              </a:ext>
-            </a:extLst>
-          </p:cNvPr>
-          <p:cNvSpPr txBox="1"/>
-          <p:nvPr/>
-        </p:nvSpPr>
-        <p:spPr>
-          <a:xfrm>
-            <a:off x="3197742" y="4876530"/>
-            <a:ext cx="234360" cy="215444"/>
-          </a:xfrm>
-          <a:prstGeom prst="rect">
-            <a:avLst/>
-          </a:prstGeom>
-          <a:noFill/>
-        </p:spPr>
-        <p:txBody>
-          <a:bodyPr wrap="none" rtlCol="0">
-            <a:spAutoFit/>
-          </a:bodyPr>
-          <a:lstStyle/>
-          <a:p>
-            <a:r>
-              <a:rPr lang="en-US" sz="800" dirty="0"/>
-              <a:t>j.</a:t>
-            </a:r>
-          </a:p>
-        </p:txBody>
-      </p:sp>
-      <p:sp>
-        <p:nvSpPr>
-          <p:cNvPr id="71" name="TextBox 70">
-            <a:extLst>
-              <a:ext uri="{FF2B5EF4-FFF2-40B4-BE49-F238E27FC236}">
-                <a16:creationId xmlns:a16="http://schemas.microsoft.com/office/drawing/2014/main" id="{9FDC6ECD-D962-FC4A-8E75-D4D77D470EE2}"/>
-              </a:ext>
-            </a:extLst>
-          </p:cNvPr>
-          <p:cNvSpPr txBox="1"/>
-          <p:nvPr/>
-        </p:nvSpPr>
-        <p:spPr>
-          <a:xfrm>
-            <a:off x="951982" y="6170103"/>
-            <a:ext cx="256802" cy="215444"/>
-          </a:xfrm>
-          <a:prstGeom prst="rect">
-            <a:avLst/>
-          </a:prstGeom>
-          <a:noFill/>
-        </p:spPr>
-        <p:txBody>
-          <a:bodyPr wrap="none" rtlCol="0">
-            <a:spAutoFit/>
-          </a:bodyPr>
-          <a:lstStyle/>
-          <a:p>
-            <a:r>
-              <a:rPr lang="en-US" sz="800" dirty="0"/>
-              <a:t>k.</a:t>
+            <a:pPr algn="ctr"/>
+            <a:r>
+              <a:rPr lang="en-US" sz="1000" dirty="0"/>
+              <a:t>Chained Seeds</a:t>
             </a:r>
           </a:p>
         </p:txBody>
@@ -4075,7 +4872,7 @@
     </p:spTree>
     <p:extLst>
       <p:ext uri="{BB962C8B-B14F-4D97-AF65-F5344CB8AC3E}">
-        <p14:creationId xmlns:p14="http://schemas.microsoft.com/office/powerpoint/2010/main" val="3334524794"/>
+        <p14:creationId xmlns:p14="http://schemas.microsoft.com/office/powerpoint/2010/main" val="357910987"/>
       </p:ext>
     </p:extLst>
   </p:cSld>
@@ -4344,4 +5141,299 @@
     </a:ext>
   </a:extLst>
 </a:theme>
+</file>
+
+<file path=ppt/theme/theme2.xml><?xml version="1.0" encoding="utf-8"?>
+<a:theme xmlns:a="http://schemas.openxmlformats.org/drawingml/2006/main" name="Office Theme">
+  <a:themeElements>
+    <a:clrScheme name="Office">
+      <a:dk1>
+        <a:sysClr val="windowText" lastClr="000000"/>
+      </a:dk1>
+      <a:lt1>
+        <a:sysClr val="window" lastClr="FFFFFF"/>
+      </a:lt1>
+      <a:dk2>
+        <a:srgbClr val="44546A"/>
+      </a:dk2>
+      <a:lt2>
+        <a:srgbClr val="E7E6E6"/>
+      </a:lt2>
+      <a:accent1>
+        <a:srgbClr val="4472C4"/>
+      </a:accent1>
+      <a:accent2>
+        <a:srgbClr val="ED7D31"/>
+      </a:accent2>
+      <a:accent3>
+        <a:srgbClr val="A5A5A5"/>
+      </a:accent3>
+      <a:accent4>
+        <a:srgbClr val="FFC000"/>
+      </a:accent4>
+      <a:accent5>
+        <a:srgbClr val="5B9BD5"/>
+      </a:accent5>
+      <a:accent6>
+        <a:srgbClr val="70AD47"/>
+      </a:accent6>
+      <a:hlink>
+        <a:srgbClr val="0563C1"/>
+      </a:hlink>
+      <a:folHlink>
+        <a:srgbClr val="954F72"/>
+      </a:folHlink>
+    </a:clrScheme>
+    <a:fontScheme name="Office">
+      <a:majorFont>
+        <a:latin typeface="Calibri Light" panose="020F0302020204030204"/>
+        <a:ea typeface=""/>
+        <a:cs typeface=""/>
+        <a:font script="Jpan" typeface="游ゴシック Light"/>
+        <a:font script="Hang" typeface="맑은 고딕"/>
+        <a:font script="Hans" typeface="等线 Light"/>
+        <a:font script="Hant" typeface="新細明體"/>
+        <a:font script="Arab" typeface="Times New Roman"/>
+        <a:font script="Hebr" typeface="Times New Roman"/>
+        <a:font script="Thai" typeface="Angsana New"/>
+        <a:font script="Ethi" typeface="Nyala"/>
+        <a:font script="Beng" typeface="Vrinda"/>
+        <a:font script="Gujr" typeface="Shruti"/>
+        <a:font script="Khmr" typeface="MoolBoran"/>
+        <a:font script="Knda" typeface="Tunga"/>
+        <a:font script="Guru" typeface="Raavi"/>
+        <a:font script="Cans" typeface="Euphemia"/>
+        <a:font script="Cher" typeface="Plantagenet Cherokee"/>
+        <a:font script="Yiii" typeface="Microsoft Yi Baiti"/>
+        <a:font script="Tibt" typeface="Microsoft Himalaya"/>
+        <a:font script="Thaa" typeface="MV Boli"/>
+        <a:font script="Deva" typeface="Mangal"/>
+        <a:font script="Telu" typeface="Gautami"/>
+        <a:font script="Taml" typeface="Latha"/>
+        <a:font script="Syrc" typeface="Estrangelo Edessa"/>
+        <a:font script="Orya" typeface="Kalinga"/>
+        <a:font script="Mlym" typeface="Kartika"/>
+        <a:font script="Laoo" typeface="DokChampa"/>
+        <a:font script="Sinh" typeface="Iskoola Pota"/>
+        <a:font script="Mong" typeface="Mongolian Baiti"/>
+        <a:font script="Viet" typeface="Times New Roman"/>
+        <a:font script="Uigh" typeface="Microsoft Uighur"/>
+        <a:font script="Geor" typeface="Sylfaen"/>
+        <a:font script="Armn" typeface="Arial"/>
+        <a:font script="Bugi" typeface="Leelawadee UI"/>
+        <a:font script="Bopo" typeface="Microsoft JhengHei"/>
+        <a:font script="Java" typeface="Javanese Text"/>
+        <a:font script="Lisu" typeface="Segoe UI"/>
+        <a:font script="Mymr" typeface="Myanmar Text"/>
+        <a:font script="Nkoo" typeface="Ebrima"/>
+        <a:font script="Olck" typeface="Nirmala UI"/>
+        <a:font script="Osma" typeface="Ebrima"/>
+        <a:font script="Phag" typeface="Phagspa"/>
+        <a:font script="Syrn" typeface="Estrangelo Edessa"/>
+        <a:font script="Syrj" typeface="Estrangelo Edessa"/>
+        <a:font script="Syre" typeface="Estrangelo Edessa"/>
+        <a:font script="Sora" typeface="Nirmala UI"/>
+        <a:font script="Tale" typeface="Microsoft Tai Le"/>
+        <a:font script="Talu" typeface="Microsoft New Tai Lue"/>
+        <a:font script="Tfng" typeface="Ebrima"/>
+      </a:majorFont>
+      <a:minorFont>
+        <a:latin typeface="Calibri" panose="020F0502020204030204"/>
+        <a:ea typeface=""/>
+        <a:cs typeface=""/>
+        <a:font script="Jpan" typeface="游ゴシック"/>
+        <a:font script="Hang" typeface="맑은 고딕"/>
+        <a:font script="Hans" typeface="等线"/>
+        <a:font script="Hant" typeface="新細明體"/>
+        <a:font script="Arab" typeface="Arial"/>
+        <a:font script="Hebr" typeface="Arial"/>
+        <a:font script="Thai" typeface="Cordia New"/>
+        <a:font script="Ethi" typeface="Nyala"/>
+        <a:font script="Beng" typeface="Vrinda"/>
+        <a:font script="Gujr" typeface="Shruti"/>
+        <a:font script="Khmr" typeface="DaunPenh"/>
+        <a:font script="Knda" typeface="Tunga"/>
+        <a:font script="Guru" typeface="Raavi"/>
+        <a:font script="Cans" typeface="Euphemia"/>
+        <a:font script="Cher" typeface="Plantagenet Cherokee"/>
+        <a:font script="Yiii" typeface="Microsoft Yi Baiti"/>
+        <a:font script="Tibt" typeface="Microsoft Himalaya"/>
+        <a:font script="Thaa" typeface="MV Boli"/>
+        <a:font script="Deva" typeface="Mangal"/>
+        <a:font script="Telu" typeface="Gautami"/>
+        <a:font script="Taml" typeface="Latha"/>
+        <a:font script="Syrc" typeface="Estrangelo Edessa"/>
+        <a:font script="Orya" typeface="Kalinga"/>
+        <a:font script="Mlym" typeface="Kartika"/>
+        <a:font script="Laoo" typeface="DokChampa"/>
+        <a:font script="Sinh" typeface="Iskoola Pota"/>
+        <a:font script="Mong" typeface="Mongolian Baiti"/>
+        <a:font script="Viet" typeface="Arial"/>
+        <a:font script="Uigh" typeface="Microsoft Uighur"/>
+        <a:font script="Geor" typeface="Sylfaen"/>
+        <a:font script="Armn" typeface="Arial"/>
+        <a:font script="Bugi" typeface="Leelawadee UI"/>
+        <a:font script="Bopo" typeface="Microsoft JhengHei"/>
+        <a:font script="Java" typeface="Javanese Text"/>
+        <a:font script="Lisu" typeface="Segoe UI"/>
+        <a:font script="Mymr" typeface="Myanmar Text"/>
+        <a:font script="Nkoo" typeface="Ebrima"/>
+        <a:font script="Olck" typeface="Nirmala UI"/>
+        <a:font script="Osma" typeface="Ebrima"/>
+        <a:font script="Phag" typeface="Phagspa"/>
+        <a:font script="Syrn" typeface="Estrangelo Edessa"/>
+        <a:font script="Syrj" typeface="Estrangelo Edessa"/>
+        <a:font script="Syre" typeface="Estrangelo Edessa"/>
+        <a:font script="Sora" typeface="Nirmala UI"/>
+        <a:font script="Tale" typeface="Microsoft Tai Le"/>
+        <a:font script="Talu" typeface="Microsoft New Tai Lue"/>
+        <a:font script="Tfng" typeface="Ebrima"/>
+      </a:minorFont>
+    </a:fontScheme>
+    <a:fmtScheme name="Office">
+      <a:fillStyleLst>
+        <a:solidFill>
+          <a:schemeClr val="phClr"/>
+        </a:solidFill>
+        <a:gradFill rotWithShape="1">
+          <a:gsLst>
+            <a:gs pos="0">
+              <a:schemeClr val="phClr">
+                <a:lumMod val="110000"/>
+                <a:satMod val="105000"/>
+                <a:tint val="67000"/>
+              </a:schemeClr>
+            </a:gs>
+            <a:gs pos="50000">
+              <a:schemeClr val="phClr">
+                <a:lumMod val="105000"/>
+                <a:satMod val="103000"/>
+                <a:tint val="73000"/>
+              </a:schemeClr>
+            </a:gs>
+            <a:gs pos="100000">
+              <a:schemeClr val="phClr">
+                <a:lumMod val="105000"/>
+                <a:satMod val="109000"/>
+                <a:tint val="81000"/>
+              </a:schemeClr>
+            </a:gs>
+          </a:gsLst>
+          <a:lin ang="5400000" scaled="0"/>
+        </a:gradFill>
+        <a:gradFill rotWithShape="1">
+          <a:gsLst>
+            <a:gs pos="0">
+              <a:schemeClr val="phClr">
+                <a:satMod val="103000"/>
+                <a:lumMod val="102000"/>
+                <a:tint val="94000"/>
+              </a:schemeClr>
+            </a:gs>
+            <a:gs pos="50000">
+              <a:schemeClr val="phClr">
+                <a:satMod val="110000"/>
+                <a:lumMod val="100000"/>
+                <a:shade val="100000"/>
+              </a:schemeClr>
+            </a:gs>
+            <a:gs pos="100000">
+              <a:schemeClr val="phClr">
+                <a:lumMod val="99000"/>
+                <a:satMod val="120000"/>
+                <a:shade val="78000"/>
+              </a:schemeClr>
+            </a:gs>
+          </a:gsLst>
+          <a:lin ang="5400000" scaled="0"/>
+        </a:gradFill>
+      </a:fillStyleLst>
+      <a:lnStyleLst>
+        <a:ln w="6350" cap="flat" cmpd="sng" algn="ctr">
+          <a:solidFill>
+            <a:schemeClr val="phClr"/>
+          </a:solidFill>
+          <a:prstDash val="solid"/>
+          <a:miter lim="800000"/>
+        </a:ln>
+        <a:ln w="12700" cap="flat" cmpd="sng" algn="ctr">
+          <a:solidFill>
+            <a:schemeClr val="phClr"/>
+          </a:solidFill>
+          <a:prstDash val="solid"/>
+          <a:miter lim="800000"/>
+        </a:ln>
+        <a:ln w="19050" cap="flat" cmpd="sng" algn="ctr">
+          <a:solidFill>
+            <a:schemeClr val="phClr"/>
+          </a:solidFill>
+          <a:prstDash val="solid"/>
+          <a:miter lim="800000"/>
+        </a:ln>
+      </a:lnStyleLst>
+      <a:effectStyleLst>
+        <a:effectStyle>
+          <a:effectLst/>
+        </a:effectStyle>
+        <a:effectStyle>
+          <a:effectLst/>
+        </a:effectStyle>
+        <a:effectStyle>
+          <a:effectLst>
+            <a:outerShdw blurRad="57150" dist="19050" dir="5400000" algn="ctr" rotWithShape="0">
+              <a:srgbClr val="000000">
+                <a:alpha val="63000"/>
+              </a:srgbClr>
+            </a:outerShdw>
+          </a:effectLst>
+        </a:effectStyle>
+      </a:effectStyleLst>
+      <a:bgFillStyleLst>
+        <a:solidFill>
+          <a:schemeClr val="phClr"/>
+        </a:solidFill>
+        <a:solidFill>
+          <a:schemeClr val="phClr">
+            <a:tint val="95000"/>
+            <a:satMod val="170000"/>
+          </a:schemeClr>
+        </a:solidFill>
+        <a:gradFill rotWithShape="1">
+          <a:gsLst>
+            <a:gs pos="0">
+              <a:schemeClr val="phClr">
+                <a:tint val="93000"/>
+                <a:satMod val="150000"/>
+                <a:shade val="98000"/>
+                <a:lumMod val="102000"/>
+              </a:schemeClr>
+            </a:gs>
+            <a:gs pos="50000">
+              <a:schemeClr val="phClr">
+                <a:tint val="98000"/>
+                <a:satMod val="130000"/>
+                <a:shade val="90000"/>
+                <a:lumMod val="103000"/>
+              </a:schemeClr>
+            </a:gs>
+            <a:gs pos="100000">
+              <a:schemeClr val="phClr">
+                <a:shade val="63000"/>
+                <a:satMod val="120000"/>
+              </a:schemeClr>
+            </a:gs>
+          </a:gsLst>
+          <a:lin ang="5400000" scaled="0"/>
+        </a:gradFill>
+      </a:bgFillStyleLst>
+    </a:fmtScheme>
+  </a:themeElements>
+  <a:objectDefaults/>
+  <a:extraClrSchemeLst/>
+  <a:extLst>
+    <a:ext uri="{05A4C25C-085E-4340-85A3-A5531E510DB2}">
+      <thm15:themeFamily xmlns:thm15="http://schemas.microsoft.com/office/thememl/2012/main" name="Office Theme" id="{62F939B6-93AF-4DB8-9C6B-D6C7DFDC589F}" vid="{4A3C46E8-61CC-4603-A589-7422A47A8E4A}"/>
+    </a:ext>
+  </a:extLst>
+</a:theme>
 </file>
</xml_diff>

<commit_message>
Added Archaeology Trend Plot
</commit_message>
<xml_diff>
--- a/multi_panel/Figure2.pptx
+++ b/multi_panel/Figure2.pptx
@@ -199,7 +199,7 @@
           <a:p>
             <a:fld id="{6655240A-E1F9-DE48-9F45-1E587C6F8463}" type="datetimeFigureOut">
               <a:rPr lang="en-US" smtClean="0"/>
-              <a:t>1/29/20</a:t>
+              <a:t>2/5/20</a:t>
             </a:fld>
             <a:endParaRPr lang="en-US"/>
           </a:p>
@@ -681,7 +681,7 @@
           <a:p>
             <a:fld id="{9DCD1679-434F-3744-9116-25F6CCA1F53C}" type="datetimeFigureOut">
               <a:rPr lang="en-US" smtClean="0"/>
-              <a:t>1/29/20</a:t>
+              <a:t>2/5/20</a:t>
             </a:fld>
             <a:endParaRPr lang="en-US"/>
           </a:p>
@@ -851,7 +851,7 @@
           <a:p>
             <a:fld id="{9DCD1679-434F-3744-9116-25F6CCA1F53C}" type="datetimeFigureOut">
               <a:rPr lang="en-US" smtClean="0"/>
-              <a:t>1/29/20</a:t>
+              <a:t>2/5/20</a:t>
             </a:fld>
             <a:endParaRPr lang="en-US"/>
           </a:p>
@@ -1031,7 +1031,7 @@
           <a:p>
             <a:fld id="{9DCD1679-434F-3744-9116-25F6CCA1F53C}" type="datetimeFigureOut">
               <a:rPr lang="en-US" smtClean="0"/>
-              <a:t>1/29/20</a:t>
+              <a:t>2/5/20</a:t>
             </a:fld>
             <a:endParaRPr lang="en-US"/>
           </a:p>
@@ -1201,7 +1201,7 @@
           <a:p>
             <a:fld id="{9DCD1679-434F-3744-9116-25F6CCA1F53C}" type="datetimeFigureOut">
               <a:rPr lang="en-US" smtClean="0"/>
-              <a:t>1/29/20</a:t>
+              <a:t>2/5/20</a:t>
             </a:fld>
             <a:endParaRPr lang="en-US"/>
           </a:p>
@@ -1445,7 +1445,7 @@
           <a:p>
             <a:fld id="{9DCD1679-434F-3744-9116-25F6CCA1F53C}" type="datetimeFigureOut">
               <a:rPr lang="en-US" smtClean="0"/>
-              <a:t>1/29/20</a:t>
+              <a:t>2/5/20</a:t>
             </a:fld>
             <a:endParaRPr lang="en-US"/>
           </a:p>
@@ -1677,7 +1677,7 @@
           <a:p>
             <a:fld id="{9DCD1679-434F-3744-9116-25F6CCA1F53C}" type="datetimeFigureOut">
               <a:rPr lang="en-US" smtClean="0"/>
-              <a:t>1/29/20</a:t>
+              <a:t>2/5/20</a:t>
             </a:fld>
             <a:endParaRPr lang="en-US"/>
           </a:p>
@@ -2044,7 +2044,7 @@
           <a:p>
             <a:fld id="{9DCD1679-434F-3744-9116-25F6CCA1F53C}" type="datetimeFigureOut">
               <a:rPr lang="en-US" smtClean="0"/>
-              <a:t>1/29/20</a:t>
+              <a:t>2/5/20</a:t>
             </a:fld>
             <a:endParaRPr lang="en-US"/>
           </a:p>
@@ -2162,7 +2162,7 @@
           <a:p>
             <a:fld id="{9DCD1679-434F-3744-9116-25F6CCA1F53C}" type="datetimeFigureOut">
               <a:rPr lang="en-US" smtClean="0"/>
-              <a:t>1/29/20</a:t>
+              <a:t>2/5/20</a:t>
             </a:fld>
             <a:endParaRPr lang="en-US"/>
           </a:p>
@@ -2257,7 +2257,7 @@
           <a:p>
             <a:fld id="{9DCD1679-434F-3744-9116-25F6CCA1F53C}" type="datetimeFigureOut">
               <a:rPr lang="en-US" smtClean="0"/>
-              <a:t>1/29/20</a:t>
+              <a:t>2/5/20</a:t>
             </a:fld>
             <a:endParaRPr lang="en-US"/>
           </a:p>
@@ -2534,7 +2534,7 @@
           <a:p>
             <a:fld id="{9DCD1679-434F-3744-9116-25F6CCA1F53C}" type="datetimeFigureOut">
               <a:rPr lang="en-US" smtClean="0"/>
-              <a:t>1/29/20</a:t>
+              <a:t>2/5/20</a:t>
             </a:fld>
             <a:endParaRPr lang="en-US"/>
           </a:p>
@@ -2791,7 +2791,7 @@
           <a:p>
             <a:fld id="{9DCD1679-434F-3744-9116-25F6CCA1F53C}" type="datetimeFigureOut">
               <a:rPr lang="en-US" smtClean="0"/>
-              <a:t>1/29/20</a:t>
+              <a:t>2/5/20</a:t>
             </a:fld>
             <a:endParaRPr lang="en-US"/>
           </a:p>
@@ -3004,7 +3004,7 @@
           <a:p>
             <a:fld id="{9DCD1679-434F-3744-9116-25F6CCA1F53C}" type="datetimeFigureOut">
               <a:rPr lang="en-US" smtClean="0"/>
-              <a:t>1/29/20</a:t>
+              <a:t>2/5/20</a:t>
             </a:fld>
             <a:endParaRPr lang="en-US"/>
           </a:p>
@@ -4292,7 +4292,7 @@
         </p:blipFill>
         <p:spPr>
           <a:xfrm>
-            <a:off x="407836" y="2949914"/>
+            <a:off x="382635" y="1748540"/>
             <a:ext cx="1819423" cy="909712"/>
           </a:xfrm>
           <a:prstGeom prst="rect">
@@ -4322,7 +4322,7 @@
         </p:blipFill>
         <p:spPr>
           <a:xfrm>
-            <a:off x="407835" y="1807036"/>
+            <a:off x="407836" y="2823560"/>
             <a:ext cx="1819423" cy="909712"/>
           </a:xfrm>
           <a:prstGeom prst="rect">
@@ -4352,7 +4352,7 @@
         </p:blipFill>
         <p:spPr>
           <a:xfrm>
-            <a:off x="2274441" y="2770592"/>
+            <a:off x="2264608" y="1657294"/>
             <a:ext cx="1816006" cy="1135004"/>
           </a:xfrm>
           <a:prstGeom prst="rect">
@@ -4382,7 +4382,7 @@
         </p:blipFill>
         <p:spPr>
           <a:xfrm>
-            <a:off x="2274441" y="1635895"/>
+            <a:off x="2264608" y="2813697"/>
             <a:ext cx="1816006" cy="1135003"/>
           </a:xfrm>
           <a:prstGeom prst="rect">

</xml_diff>